<commit_message>
Added abalone and saratoga imports.
</commit_message>
<xml_diff>
--- a/part1/src/importing.pptx
+++ b/part1/src/importing.pptx
@@ -5,7 +5,7 @@
     <p:sldMasterId id="2147483648" r:id="rId1"/>
   </p:sldMasterIdLst>
   <p:notesMasterIdLst>
-    <p:NotesMasterId r:id="rId23"/>
+    <p:NotesMasterId r:id="rId32"/>
   </p:notesMasterIdLst>
   <p:sldIdLst>
     <p:sldId id="256" r:id="rId2"/>
@@ -29,6 +29,15 @@
     <p:sldId id="274" r:id="rId20"/>
     <p:sldId id="275" r:id="rId21"/>
     <p:sldId id="276" r:id="rId22"/>
+    <p:sldId id="277" r:id="rId23"/>
+    <p:sldId id="278" r:id="rId24"/>
+    <p:sldId id="279" r:id="rId25"/>
+    <p:sldId id="280" r:id="rId26"/>
+    <p:sldId id="281" r:id="rId27"/>
+    <p:sldId id="282" r:id="rId28"/>
+    <p:sldId id="283" r:id="rId29"/>
+    <p:sldId id="284" r:id="rId30"/>
+    <p:sldId id="285" r:id="rId31"/>
   </p:sldIdLst>
   <p:sldSz cx="9144000" cy="6858000" type="screen4x3"/>
   <p:notesSz cx="6858000" cy="9144000"/>
@@ -732,6 +741,68 @@
               <a:t>easily.</a:t>
             </a:r>
           </a:p>
+          <a:p>
+            <a:pPr lvl="0" marL="0" indent="0">
+              <a:buNone/>
+            </a:pPr>
+          </a:p>
+          <a:p>
+            <a:pPr lvl="0" marL="0" indent="0">
+              <a:buNone/>
+            </a:pPr>
+            <a:r>
+              <a:rPr/>
+              <a:t>Here</a:t>
+            </a:r>
+            <a:r>
+              <a:rPr/>
+              <a:t> </a:t>
+            </a:r>
+            <a:r>
+              <a:rPr/>
+              <a:t>is</a:t>
+            </a:r>
+            <a:r>
+              <a:rPr/>
+              <a:t> </a:t>
+            </a:r>
+            <a:r>
+              <a:rPr/>
+              <a:t>the</a:t>
+            </a:r>
+            <a:r>
+              <a:rPr/>
+              <a:t> </a:t>
+            </a:r>
+            <a:r>
+              <a:rPr/>
+              <a:t>value</a:t>
+            </a:r>
+            <a:r>
+              <a:rPr/>
+              <a:t> </a:t>
+            </a:r>
+            <a:r>
+              <a:rPr/>
+              <a:t>of</a:t>
+            </a:r>
+            <a:r>
+              <a:rPr/>
+              <a:t> </a:t>
+            </a:r>
+            <a:r>
+              <a:rPr/>
+              <a:t>pi:</a:t>
+            </a:r>
+            <a:r>
+              <a:rPr/>
+              <a:t> </a:t>
+            </a:r>
+            <a:r>
+              <a:rPr/>
+              <a:t>3.1415927.</a:t>
+            </a:r>
+          </a:p>
         </p:txBody>
       </p:sp>
       <p:sp>
@@ -7636,6 +7707,318 @@
 </p:notes>
 </file>
 
+<file path=ppt/notesSlides/notesSlide19.xml><?xml version="1.0" encoding="utf-8"?>
+<p:notes xmlns:a="http://schemas.openxmlformats.org/drawingml/2006/main" xmlns:r="http://schemas.openxmlformats.org/officeDocument/2006/relationships" xmlns:p="http://schemas.openxmlformats.org/presentationml/2006/main">
+  <p:cSld>
+    <p:spTree>
+      <p:nvGrpSpPr>
+        <p:cNvPr id="1" name=""/>
+        <p:cNvGrpSpPr/>
+        <p:nvPr/>
+      </p:nvGrpSpPr>
+      <p:grpSpPr>
+        <a:xfrm>
+          <a:off x="0" y="0"/>
+          <a:ext cx="0" cy="0"/>
+          <a:chOff x="0" y="0"/>
+          <a:chExt cx="0" cy="0"/>
+        </a:xfrm>
+      </p:grpSpPr>
+      <p:sp>
+        <p:nvSpPr>
+          <p:cNvPr id="2" name="Slide Image Placeholder 1"/>
+          <p:cNvSpPr>
+            <a:spLocks noGrp="1" noRot="1" noChangeAspect="1"/>
+          </p:cNvSpPr>
+          <p:nvPr>
+            <p:ph type="sldImg"/>
+          </p:nvPr>
+        </p:nvSpPr>
+        <p:spPr/>
+      </p:sp>
+      <p:sp>
+        <p:nvSpPr>
+          <p:cNvPr id="3" name="Notes Placeholder 2"/>
+          <p:cNvSpPr>
+            <a:spLocks noGrp="1"/>
+          </p:cNvSpPr>
+          <p:nvPr>
+            <p:ph type="body" idx="1"/>
+          </p:nvPr>
+        </p:nvSpPr>
+        <p:spPr/>
+        <p:txBody>
+          <a:bodyPr/>
+          <a:lstStyle/>
+          <a:p>
+            <a:pPr lvl="0" marL="0" indent="0">
+              <a:buNone/>
+            </a:pPr>
+            <a:r>
+              <a:rPr/>
+              <a:t>Import</a:t>
+            </a:r>
+            <a:r>
+              <a:rPr/>
+              <a:t> </a:t>
+            </a:r>
+            <a:r>
+              <a:rPr/>
+              <a:t>the</a:t>
+            </a:r>
+            <a:r>
+              <a:rPr/>
+              <a:t> </a:t>
+            </a:r>
+            <a:r>
+              <a:rPr/>
+              <a:t>Abalone</a:t>
+            </a:r>
+            <a:r>
+              <a:rPr/>
+              <a:t> </a:t>
+            </a:r>
+            <a:r>
+              <a:rPr/>
+              <a:t>age</a:t>
+            </a:r>
+            <a:r>
+              <a:rPr/>
+              <a:t> </a:t>
+            </a:r>
+            <a:r>
+              <a:rPr/>
+              <a:t>prediction</a:t>
+            </a:r>
+            <a:r>
+              <a:rPr/>
+              <a:t> </a:t>
+            </a:r>
+            <a:r>
+              <a:rPr/>
+              <a:t>file.</a:t>
+            </a:r>
+          </a:p>
+          <a:p>
+            <a:pPr lvl="0" marL="0" indent="0">
+              <a:buNone/>
+            </a:pPr>
+          </a:p>
+          <a:p>
+            <a:pPr lvl="0" marL="0" indent="0">
+              <a:buNone/>
+            </a:pPr>
+            <a:r>
+              <a:rPr/>
+              <a:t>Tell</a:t>
+            </a:r>
+            <a:r>
+              <a:rPr/>
+              <a:t> </a:t>
+            </a:r>
+            <a:r>
+              <a:rPr/>
+              <a:t>SAS</a:t>
+            </a:r>
+            <a:r>
+              <a:rPr/>
+              <a:t> </a:t>
+            </a:r>
+            <a:r>
+              <a:rPr/>
+              <a:t>where</a:t>
+            </a:r>
+            <a:r>
+              <a:rPr/>
+              <a:t> </a:t>
+            </a:r>
+            <a:r>
+              <a:rPr/>
+              <a:t>to</a:t>
+            </a:r>
+            <a:r>
+              <a:rPr/>
+              <a:t> </a:t>
+            </a:r>
+            <a:r>
+              <a:rPr/>
+              <a:t>find</a:t>
+            </a:r>
+            <a:r>
+              <a:rPr/>
+              <a:t> </a:t>
+            </a:r>
+            <a:r>
+              <a:rPr/>
+              <a:t>the</a:t>
+            </a:r>
+            <a:r>
+              <a:rPr/>
+              <a:t> </a:t>
+            </a:r>
+            <a:r>
+              <a:rPr/>
+              <a:t>data.</a:t>
+            </a:r>
+            <a:r>
+              <a:rPr/>
+              <a:t> </a:t>
+            </a:r>
+            <a:r>
+              <a:rPr/>
+              <a:t>Notice</a:t>
+            </a:r>
+            <a:r>
+              <a:rPr/>
+              <a:t> </a:t>
+            </a:r>
+            <a:r>
+              <a:rPr/>
+              <a:t>that</a:t>
+            </a:r>
+            <a:r>
+              <a:rPr/>
+              <a:t> </a:t>
+            </a:r>
+            <a:r>
+              <a:rPr/>
+              <a:t>the</a:t>
+            </a:r>
+            <a:r>
+              <a:rPr/>
+              <a:t> </a:t>
+            </a:r>
+            <a:r>
+              <a:rPr/>
+              <a:t>filename</a:t>
+            </a:r>
+            <a:r>
+              <a:rPr/>
+              <a:t> </a:t>
+            </a:r>
+            <a:r>
+              <a:rPr/>
+              <a:t>statement</a:t>
+            </a:r>
+            <a:r>
+              <a:rPr/>
+              <a:t> </a:t>
+            </a:r>
+            <a:r>
+              <a:rPr/>
+              <a:t>includes</a:t>
+            </a:r>
+            <a:r>
+              <a:rPr/>
+              <a:t> </a:t>
+            </a:r>
+            <a:r>
+              <a:rPr/>
+              <a:t>a</a:t>
+            </a:r>
+            <a:r>
+              <a:rPr/>
+              <a:t> </a:t>
+            </a:r>
+            <a:r>
+              <a:rPr/>
+              <a:t>directl</a:t>
+            </a:r>
+            <a:r>
+              <a:rPr/>
+              <a:t> </a:t>
+            </a:r>
+            <a:r>
+              <a:rPr/>
+              <a:t>link</a:t>
+            </a:r>
+            <a:r>
+              <a:rPr/>
+              <a:t> </a:t>
+            </a:r>
+            <a:r>
+              <a:rPr/>
+              <a:t>to</a:t>
+            </a:r>
+            <a:r>
+              <a:rPr/>
+              <a:t> </a:t>
+            </a:r>
+            <a:r>
+              <a:rPr/>
+              <a:t>the</a:t>
+            </a:r>
+            <a:r>
+              <a:rPr/>
+              <a:t> </a:t>
+            </a:r>
+            <a:r>
+              <a:rPr/>
+              <a:t>website</a:t>
+            </a:r>
+            <a:r>
+              <a:rPr/>
+              <a:t> </a:t>
+            </a:r>
+            <a:r>
+              <a:rPr/>
+              <a:t>that</a:t>
+            </a:r>
+            <a:r>
+              <a:rPr/>
+              <a:t> </a:t>
+            </a:r>
+            <a:r>
+              <a:rPr/>
+              <a:t>has</a:t>
+            </a:r>
+            <a:r>
+              <a:rPr/>
+              <a:t> </a:t>
+            </a:r>
+            <a:r>
+              <a:rPr/>
+              <a:t>this</a:t>
+            </a:r>
+            <a:r>
+              <a:rPr/>
+              <a:t> </a:t>
+            </a:r>
+            <a:r>
+              <a:rPr/>
+              <a:t>data.</a:t>
+            </a:r>
+          </a:p>
+        </p:txBody>
+      </p:sp>
+      <p:sp>
+        <p:nvSpPr>
+          <p:cNvPr id="4" name="Slide Number Placeholder 3"/>
+          <p:cNvSpPr>
+            <a:spLocks noGrp="1"/>
+          </p:cNvSpPr>
+          <p:nvPr>
+            <p:ph type="sldNum" sz="quarter" idx="10"/>
+          </p:nvPr>
+        </p:nvSpPr>
+        <p:spPr/>
+        <p:txBody>
+          <a:bodyPr/>
+          <a:lstStyle/>
+          <a:p>
+            <a:fld id="{18BDFEC3-8487-43E8-A154-7C12CBC1FFF2}" type="slidenum">
+              <a:rPr lang="en-US"/>
+              <a:t>24</a:t>
+            </a:fld>
+            <a:endParaRPr lang="en-US"/>
+          </a:p>
+        </p:txBody>
+      </p:sp>
+    </p:spTree>
+  </p:cSld>
+</p:notes>
+</file>
+
 <file path=ppt/notesSlides/notesSlide2.xml><?xml version="1.0" encoding="utf-8"?>
 <p:notes xmlns:a="http://schemas.openxmlformats.org/drawingml/2006/main" xmlns:r="http://schemas.openxmlformats.org/officeDocument/2006/relationships" xmlns:p="http://schemas.openxmlformats.org/presentationml/2006/main">
   <p:cSld>
@@ -8456,6 +8839,1830 @@
             <a:fld id="{18BDFEC3-8487-43E8-A154-7C12CBC1FFF2}" type="slidenum">
               <a:rPr lang="en-US"/>
               <a:t>3</a:t>
+            </a:fld>
+            <a:endParaRPr lang="en-US"/>
+          </a:p>
+        </p:txBody>
+      </p:sp>
+    </p:spTree>
+  </p:cSld>
+</p:notes>
+</file>
+
+<file path=ppt/notesSlides/notesSlide20.xml><?xml version="1.0" encoding="utf-8"?>
+<p:notes xmlns:a="http://schemas.openxmlformats.org/drawingml/2006/main" xmlns:r="http://schemas.openxmlformats.org/officeDocument/2006/relationships" xmlns:p="http://schemas.openxmlformats.org/presentationml/2006/main">
+  <p:cSld>
+    <p:spTree>
+      <p:nvGrpSpPr>
+        <p:cNvPr id="1" name=""/>
+        <p:cNvGrpSpPr/>
+        <p:nvPr/>
+      </p:nvGrpSpPr>
+      <p:grpSpPr>
+        <a:xfrm>
+          <a:off x="0" y="0"/>
+          <a:ext cx="0" cy="0"/>
+          <a:chOff x="0" y="0"/>
+          <a:chExt cx="0" cy="0"/>
+        </a:xfrm>
+      </p:grpSpPr>
+      <p:sp>
+        <p:nvSpPr>
+          <p:cNvPr id="2" name="Slide Image Placeholder 1"/>
+          <p:cNvSpPr>
+            <a:spLocks noGrp="1" noRot="1" noChangeAspect="1"/>
+          </p:cNvSpPr>
+          <p:nvPr>
+            <p:ph type="sldImg"/>
+          </p:nvPr>
+        </p:nvSpPr>
+        <p:spPr/>
+      </p:sp>
+      <p:sp>
+        <p:nvSpPr>
+          <p:cNvPr id="3" name="Notes Placeholder 2"/>
+          <p:cNvSpPr>
+            <a:spLocks noGrp="1"/>
+          </p:cNvSpPr>
+          <p:nvPr>
+            <p:ph type="body" idx="1"/>
+          </p:nvPr>
+        </p:nvSpPr>
+        <p:spPr/>
+        <p:txBody>
+          <a:bodyPr/>
+          <a:lstStyle/>
+          <a:p>
+            <a:pPr lvl="0" marL="0" indent="0">
+              <a:buNone/>
+            </a:pPr>
+            <a:r>
+              <a:rPr/>
+              <a:t>Use</a:t>
+            </a:r>
+            <a:r>
+              <a:rPr/>
+              <a:t> </a:t>
+            </a:r>
+            <a:r>
+              <a:rPr/>
+              <a:t>the</a:t>
+            </a:r>
+            <a:r>
+              <a:rPr/>
+              <a:t> </a:t>
+            </a:r>
+            <a:r>
+              <a:rPr/>
+              <a:t>data</a:t>
+            </a:r>
+            <a:r>
+              <a:rPr/>
+              <a:t> </a:t>
+            </a:r>
+            <a:r>
+              <a:rPr/>
+              <a:t>step</a:t>
+            </a:r>
+            <a:r>
+              <a:rPr/>
+              <a:t> </a:t>
+            </a:r>
+            <a:r>
+              <a:rPr/>
+              <a:t>because</a:t>
+            </a:r>
+            <a:r>
+              <a:rPr/>
+              <a:t> </a:t>
+            </a:r>
+            <a:r>
+              <a:rPr/>
+              <a:t>the</a:t>
+            </a:r>
+            <a:r>
+              <a:rPr/>
+              <a:t> </a:t>
+            </a:r>
+            <a:r>
+              <a:rPr/>
+              <a:t>names</a:t>
+            </a:r>
+            <a:r>
+              <a:rPr/>
+              <a:t> </a:t>
+            </a:r>
+            <a:r>
+              <a:rPr/>
+              <a:t>of</a:t>
+            </a:r>
+            <a:r>
+              <a:rPr/>
+              <a:t> </a:t>
+            </a:r>
+            <a:r>
+              <a:rPr/>
+              <a:t>the</a:t>
+            </a:r>
+            <a:r>
+              <a:rPr/>
+              <a:t> </a:t>
+            </a:r>
+            <a:r>
+              <a:rPr/>
+              <a:t>variables</a:t>
+            </a:r>
+            <a:r>
+              <a:rPr/>
+              <a:t> </a:t>
+            </a:r>
+            <a:r>
+              <a:rPr/>
+              <a:t>are</a:t>
+            </a:r>
+            <a:r>
+              <a:rPr/>
+              <a:t> </a:t>
+            </a:r>
+            <a:r>
+              <a:rPr/>
+              <a:t>not</a:t>
+            </a:r>
+            <a:r>
+              <a:rPr/>
+              <a:t> </a:t>
+            </a:r>
+            <a:r>
+              <a:rPr/>
+              <a:t>on</a:t>
+            </a:r>
+            <a:r>
+              <a:rPr/>
+              <a:t> </a:t>
+            </a:r>
+            <a:r>
+              <a:rPr/>
+              <a:t>the</a:t>
+            </a:r>
+            <a:r>
+              <a:rPr/>
+              <a:t> </a:t>
+            </a:r>
+            <a:r>
+              <a:rPr/>
+              <a:t>first</a:t>
+            </a:r>
+            <a:r>
+              <a:rPr/>
+              <a:t> </a:t>
+            </a:r>
+            <a:r>
+              <a:rPr/>
+              <a:t>line</a:t>
+            </a:r>
+            <a:r>
+              <a:rPr/>
+              <a:t> </a:t>
+            </a:r>
+            <a:r>
+              <a:rPr/>
+              <a:t>of</a:t>
+            </a:r>
+            <a:r>
+              <a:rPr/>
+              <a:t> </a:t>
+            </a:r>
+            <a:r>
+              <a:rPr/>
+              <a:t>the</a:t>
+            </a:r>
+            <a:r>
+              <a:rPr/>
+              <a:t> </a:t>
+            </a:r>
+            <a:r>
+              <a:rPr/>
+              <a:t>file.</a:t>
+            </a:r>
+          </a:p>
+          <a:p>
+            <a:pPr lvl="0" marL="0" indent="0">
+              <a:buNone/>
+            </a:pPr>
+          </a:p>
+          <a:p>
+            <a:pPr lvl="0" marL="0" indent="0">
+              <a:buNone/>
+            </a:pPr>
+            <a:r>
+              <a:rPr/>
+              <a:t>This</a:t>
+            </a:r>
+            <a:r>
+              <a:rPr/>
+              <a:t> </a:t>
+            </a:r>
+            <a:r>
+              <a:rPr/>
+              <a:t>file</a:t>
+            </a:r>
+            <a:r>
+              <a:rPr/>
+              <a:t> </a:t>
+            </a:r>
+            <a:r>
+              <a:rPr/>
+              <a:t>uses</a:t>
+            </a:r>
+            <a:r>
+              <a:rPr/>
+              <a:t> </a:t>
+            </a:r>
+            <a:r>
+              <a:rPr/>
+              <a:t>commas</a:t>
+            </a:r>
+            <a:r>
+              <a:rPr/>
+              <a:t> </a:t>
+            </a:r>
+            <a:r>
+              <a:rPr/>
+              <a:t>for</a:t>
+            </a:r>
+            <a:r>
+              <a:rPr/>
+              <a:t> </a:t>
+            </a:r>
+            <a:r>
+              <a:rPr/>
+              <a:t>delimiters.</a:t>
+            </a:r>
+            <a:r>
+              <a:rPr/>
+              <a:t> </a:t>
+            </a:r>
+            <a:r>
+              <a:rPr/>
+              <a:t>Specify</a:t>
+            </a:r>
+            <a:r>
+              <a:rPr/>
+              <a:t> </a:t>
+            </a:r>
+            <a:r>
+              <a:rPr/>
+              <a:t>this</a:t>
+            </a:r>
+            <a:r>
+              <a:rPr/>
+              <a:t> </a:t>
+            </a:r>
+            <a:r>
+              <a:rPr/>
+              <a:t>on</a:t>
+            </a:r>
+            <a:r>
+              <a:rPr/>
+              <a:t> </a:t>
+            </a:r>
+            <a:r>
+              <a:rPr/>
+              <a:t>the</a:t>
+            </a:r>
+            <a:r>
+              <a:rPr/>
+              <a:t> </a:t>
+            </a:r>
+            <a:r>
+              <a:rPr/>
+              <a:t>infile</a:t>
+            </a:r>
+            <a:r>
+              <a:rPr/>
+              <a:t> </a:t>
+            </a:r>
+            <a:r>
+              <a:rPr/>
+              <a:t>statement.</a:t>
+            </a:r>
+          </a:p>
+          <a:p>
+            <a:pPr lvl="0" marL="0" indent="0">
+              <a:buNone/>
+            </a:pPr>
+          </a:p>
+          <a:p>
+            <a:pPr lvl="0" marL="0" indent="0">
+              <a:buNone/>
+            </a:pPr>
+            <a:r>
+              <a:rPr/>
+              <a:t>There</a:t>
+            </a:r>
+            <a:r>
+              <a:rPr/>
+              <a:t> </a:t>
+            </a:r>
+            <a:r>
+              <a:rPr/>
+              <a:t>are</a:t>
+            </a:r>
+            <a:r>
+              <a:rPr/>
+              <a:t> </a:t>
+            </a:r>
+            <a:r>
+              <a:rPr/>
+              <a:t>nine</a:t>
+            </a:r>
+            <a:r>
+              <a:rPr/>
+              <a:t> </a:t>
+            </a:r>
+            <a:r>
+              <a:rPr/>
+              <a:t>variables</a:t>
+            </a:r>
+            <a:r>
+              <a:rPr/>
+              <a:t> </a:t>
+            </a:r>
+            <a:r>
+              <a:rPr/>
+              <a:t>in</a:t>
+            </a:r>
+            <a:r>
+              <a:rPr/>
+              <a:t> </a:t>
+            </a:r>
+            <a:r>
+              <a:rPr/>
+              <a:t>this</a:t>
+            </a:r>
+            <a:r>
+              <a:rPr/>
+              <a:t> </a:t>
+            </a:r>
+            <a:r>
+              <a:rPr/>
+              <a:t>data</a:t>
+            </a:r>
+            <a:r>
+              <a:rPr/>
+              <a:t> </a:t>
+            </a:r>
+            <a:r>
+              <a:rPr/>
+              <a:t>set.</a:t>
+            </a:r>
+            <a:r>
+              <a:rPr/>
+              <a:t> </a:t>
+            </a:r>
+            <a:r>
+              <a:rPr/>
+              <a:t>Sex</a:t>
+            </a:r>
+            <a:r>
+              <a:rPr/>
+              <a:t> </a:t>
+            </a:r>
+            <a:r>
+              <a:rPr/>
+              <a:t>is</a:t>
+            </a:r>
+            <a:r>
+              <a:rPr/>
+              <a:t> </a:t>
+            </a:r>
+            <a:r>
+              <a:rPr/>
+              <a:t>a</a:t>
+            </a:r>
+            <a:r>
+              <a:rPr/>
+              <a:t> </a:t>
+            </a:r>
+            <a:r>
+              <a:rPr/>
+              <a:t>string,</a:t>
+            </a:r>
+            <a:r>
+              <a:rPr/>
+              <a:t> </a:t>
+            </a:r>
+            <a:r>
+              <a:rPr/>
+              <a:t>a</a:t>
+            </a:r>
+            <a:r>
+              <a:rPr/>
+              <a:t> </a:t>
+            </a:r>
+            <a:r>
+              <a:rPr/>
+              <a:t>single</a:t>
+            </a:r>
+            <a:r>
+              <a:rPr/>
+              <a:t> </a:t>
+            </a:r>
+            <a:r>
+              <a:rPr/>
+              <a:t>character</a:t>
+            </a:r>
+            <a:r>
+              <a:rPr/>
+              <a:t> </a:t>
+            </a:r>
+            <a:r>
+              <a:rPr/>
+              <a:t>with</a:t>
+            </a:r>
+            <a:r>
+              <a:rPr/>
+              <a:t> </a:t>
+            </a:r>
+            <a:r>
+              <a:rPr/>
+              <a:t>values</a:t>
+            </a:r>
+            <a:r>
+              <a:rPr/>
+              <a:t> </a:t>
+            </a:r>
+            <a:r>
+              <a:rPr/>
+              <a:t>F</a:t>
+            </a:r>
+            <a:r>
+              <a:rPr/>
+              <a:t> </a:t>
+            </a:r>
+            <a:r>
+              <a:rPr/>
+              <a:t>for</a:t>
+            </a:r>
+            <a:r>
+              <a:rPr/>
+              <a:t> </a:t>
+            </a:r>
+            <a:r>
+              <a:rPr/>
+              <a:t>female,</a:t>
+            </a:r>
+            <a:r>
+              <a:rPr/>
+              <a:t> </a:t>
+            </a:r>
+            <a:r>
+              <a:rPr/>
+              <a:t>I</a:t>
+            </a:r>
+            <a:r>
+              <a:rPr/>
+              <a:t> </a:t>
+            </a:r>
+            <a:r>
+              <a:rPr/>
+              <a:t>for</a:t>
+            </a:r>
+            <a:r>
+              <a:rPr/>
+              <a:t> </a:t>
+            </a:r>
+            <a:r>
+              <a:rPr/>
+              <a:t>infant,</a:t>
+            </a:r>
+            <a:r>
+              <a:rPr/>
+              <a:t> </a:t>
+            </a:r>
+            <a:r>
+              <a:rPr/>
+              <a:t>and</a:t>
+            </a:r>
+            <a:r>
+              <a:rPr/>
+              <a:t> </a:t>
+            </a:r>
+            <a:r>
+              <a:rPr/>
+              <a:t>M</a:t>
+            </a:r>
+            <a:r>
+              <a:rPr/>
+              <a:t> </a:t>
+            </a:r>
+            <a:r>
+              <a:rPr/>
+              <a:t>for</a:t>
+            </a:r>
+            <a:r>
+              <a:rPr/>
+              <a:t> </a:t>
+            </a:r>
+            <a:r>
+              <a:rPr/>
+              <a:t>male.</a:t>
+            </a:r>
+            <a:r>
+              <a:rPr/>
+              <a:t> </a:t>
+            </a:r>
+            <a:r>
+              <a:rPr/>
+              <a:t>The</a:t>
+            </a:r>
+            <a:r>
+              <a:rPr/>
+              <a:t> </a:t>
+            </a:r>
+            <a:r>
+              <a:rPr/>
+              <a:t>other</a:t>
+            </a:r>
+            <a:r>
+              <a:rPr/>
+              <a:t> </a:t>
+            </a:r>
+            <a:r>
+              <a:rPr/>
+              <a:t>variables</a:t>
+            </a:r>
+            <a:r>
+              <a:rPr/>
+              <a:t> </a:t>
+            </a:r>
+            <a:r>
+              <a:rPr/>
+              <a:t>are</a:t>
+            </a:r>
+            <a:r>
+              <a:rPr/>
+              <a:t> </a:t>
+            </a:r>
+            <a:r>
+              <a:rPr/>
+              <a:t>numeric.</a:t>
+            </a:r>
+          </a:p>
+        </p:txBody>
+      </p:sp>
+      <p:sp>
+        <p:nvSpPr>
+          <p:cNvPr id="4" name="Slide Number Placeholder 3"/>
+          <p:cNvSpPr>
+            <a:spLocks noGrp="1"/>
+          </p:cNvSpPr>
+          <p:nvPr>
+            <p:ph type="sldNum" sz="quarter" idx="10"/>
+          </p:nvPr>
+        </p:nvSpPr>
+        <p:spPr/>
+        <p:txBody>
+          <a:bodyPr/>
+          <a:lstStyle/>
+          <a:p>
+            <a:fld id="{18BDFEC3-8487-43E8-A154-7C12CBC1FFF2}" type="slidenum">
+              <a:rPr lang="en-US"/>
+              <a:t>25</a:t>
+            </a:fld>
+            <a:endParaRPr lang="en-US"/>
+          </a:p>
+        </p:txBody>
+      </p:sp>
+    </p:spTree>
+  </p:cSld>
+</p:notes>
+</file>
+
+<file path=ppt/notesSlides/notesSlide21.xml><?xml version="1.0" encoding="utf-8"?>
+<p:notes xmlns:a="http://schemas.openxmlformats.org/drawingml/2006/main" xmlns:r="http://schemas.openxmlformats.org/officeDocument/2006/relationships" xmlns:p="http://schemas.openxmlformats.org/presentationml/2006/main">
+  <p:cSld>
+    <p:spTree>
+      <p:nvGrpSpPr>
+        <p:cNvPr id="1" name=""/>
+        <p:cNvGrpSpPr/>
+        <p:nvPr/>
+      </p:nvGrpSpPr>
+      <p:grpSpPr>
+        <a:xfrm>
+          <a:off x="0" y="0"/>
+          <a:ext cx="0" cy="0"/>
+          <a:chOff x="0" y="0"/>
+          <a:chExt cx="0" cy="0"/>
+        </a:xfrm>
+      </p:grpSpPr>
+      <p:sp>
+        <p:nvSpPr>
+          <p:cNvPr id="2" name="Slide Image Placeholder 1"/>
+          <p:cNvSpPr>
+            <a:spLocks noGrp="1" noRot="1" noChangeAspect="1"/>
+          </p:cNvSpPr>
+          <p:nvPr>
+            <p:ph type="sldImg"/>
+          </p:nvPr>
+        </p:nvSpPr>
+        <p:spPr/>
+      </p:sp>
+      <p:sp>
+        <p:nvSpPr>
+          <p:cNvPr id="3" name="Notes Placeholder 2"/>
+          <p:cNvSpPr>
+            <a:spLocks noGrp="1"/>
+          </p:cNvSpPr>
+          <p:nvPr>
+            <p:ph type="body" idx="1"/>
+          </p:nvPr>
+        </p:nvSpPr>
+        <p:spPr/>
+        <p:txBody>
+          <a:bodyPr/>
+          <a:lstStyle/>
+          <a:p>
+            <a:pPr lvl="0" marL="0" indent="0">
+              <a:buNone/>
+            </a:pPr>
+            <a:r>
+              <a:rPr/>
+              <a:t>If</a:t>
+            </a:r>
+            <a:r>
+              <a:rPr/>
+              <a:t> </a:t>
+            </a:r>
+            <a:r>
+              <a:rPr/>
+              <a:t>the</a:t>
+            </a:r>
+            <a:r>
+              <a:rPr/>
+              <a:t> </a:t>
+            </a:r>
+            <a:r>
+              <a:rPr/>
+              <a:t>import</a:t>
+            </a:r>
+            <a:r>
+              <a:rPr/>
+              <a:t> </a:t>
+            </a:r>
+            <a:r>
+              <a:rPr/>
+              <a:t>is</a:t>
+            </a:r>
+            <a:r>
+              <a:rPr/>
+              <a:t> </a:t>
+            </a:r>
+            <a:r>
+              <a:rPr/>
+              <a:t>successful,</a:t>
+            </a:r>
+            <a:r>
+              <a:rPr/>
+              <a:t> </a:t>
+            </a:r>
+            <a:r>
+              <a:rPr/>
+              <a:t>you</a:t>
+            </a:r>
+            <a:r>
+              <a:rPr/>
+              <a:t> </a:t>
+            </a:r>
+            <a:r>
+              <a:rPr/>
+              <a:t>will</a:t>
+            </a:r>
+            <a:r>
+              <a:rPr/>
+              <a:t> </a:t>
+            </a:r>
+            <a:r>
+              <a:rPr/>
+              <a:t>see</a:t>
+            </a:r>
+            <a:r>
+              <a:rPr/>
+              <a:t> </a:t>
+            </a:r>
+            <a:r>
+              <a:rPr/>
+              <a:t>a</a:t>
+            </a:r>
+            <a:r>
+              <a:rPr/>
+              <a:t> </a:t>
+            </a:r>
+            <a:r>
+              <a:rPr/>
+              <a:t>small</a:t>
+            </a:r>
+            <a:r>
+              <a:rPr/>
+              <a:t> </a:t>
+            </a:r>
+            <a:r>
+              <a:rPr/>
+              <a:t>part</a:t>
+            </a:r>
+            <a:r>
+              <a:rPr/>
+              <a:t> </a:t>
+            </a:r>
+            <a:r>
+              <a:rPr/>
+              <a:t>of</a:t>
+            </a:r>
+            <a:r>
+              <a:rPr/>
+              <a:t> </a:t>
+            </a:r>
+            <a:r>
+              <a:rPr/>
+              <a:t>the</a:t>
+            </a:r>
+            <a:r>
+              <a:rPr/>
+              <a:t> </a:t>
+            </a:r>
+            <a:r>
+              <a:rPr/>
+              <a:t>data:</a:t>
+            </a:r>
+            <a:r>
+              <a:rPr/>
+              <a:t> </a:t>
+            </a:r>
+            <a:r>
+              <a:rPr/>
+              <a:t>the</a:t>
+            </a:r>
+            <a:r>
+              <a:rPr/>
+              <a:t> </a:t>
+            </a:r>
+            <a:r>
+              <a:rPr/>
+              <a:t>first</a:t>
+            </a:r>
+            <a:r>
+              <a:rPr/>
+              <a:t> </a:t>
+            </a:r>
+            <a:r>
+              <a:rPr/>
+              <a:t>ten</a:t>
+            </a:r>
+            <a:r>
+              <a:rPr/>
+              <a:t> </a:t>
+            </a:r>
+            <a:r>
+              <a:rPr/>
+              <a:t>rows</a:t>
+            </a:r>
+            <a:r>
+              <a:rPr/>
+              <a:t> </a:t>
+            </a:r>
+            <a:r>
+              <a:rPr/>
+              <a:t>and</a:t>
+            </a:r>
+            <a:r>
+              <a:rPr/>
+              <a:t> </a:t>
+            </a:r>
+            <a:r>
+              <a:rPr/>
+              <a:t>the</a:t>
+            </a:r>
+            <a:r>
+              <a:rPr/>
+              <a:t> </a:t>
+            </a:r>
+            <a:r>
+              <a:rPr/>
+              <a:t>first</a:t>
+            </a:r>
+            <a:r>
+              <a:rPr/>
+              <a:t> </a:t>
+            </a:r>
+            <a:r>
+              <a:rPr/>
+              <a:t>five</a:t>
+            </a:r>
+            <a:r>
+              <a:rPr/>
+              <a:t> </a:t>
+            </a:r>
+            <a:r>
+              <a:rPr/>
+              <a:t>variables.</a:t>
+            </a:r>
+          </a:p>
+        </p:txBody>
+      </p:sp>
+      <p:sp>
+        <p:nvSpPr>
+          <p:cNvPr id="4" name="Slide Number Placeholder 3"/>
+          <p:cNvSpPr>
+            <a:spLocks noGrp="1"/>
+          </p:cNvSpPr>
+          <p:nvPr>
+            <p:ph type="sldNum" sz="quarter" idx="10"/>
+          </p:nvPr>
+        </p:nvSpPr>
+        <p:spPr/>
+        <p:txBody>
+          <a:bodyPr/>
+          <a:lstStyle/>
+          <a:p>
+            <a:fld id="{18BDFEC3-8487-43E8-A154-7C12CBC1FFF2}" type="slidenum">
+              <a:rPr lang="en-US"/>
+              <a:t>26</a:t>
+            </a:fld>
+            <a:endParaRPr lang="en-US"/>
+          </a:p>
+        </p:txBody>
+      </p:sp>
+    </p:spTree>
+  </p:cSld>
+</p:notes>
+</file>
+
+<file path=ppt/notesSlides/notesSlide22.xml><?xml version="1.0" encoding="utf-8"?>
+<p:notes xmlns:a="http://schemas.openxmlformats.org/drawingml/2006/main" xmlns:r="http://schemas.openxmlformats.org/officeDocument/2006/relationships" xmlns:p="http://schemas.openxmlformats.org/presentationml/2006/main">
+  <p:cSld>
+    <p:spTree>
+      <p:nvGrpSpPr>
+        <p:cNvPr id="1" name=""/>
+        <p:cNvGrpSpPr/>
+        <p:nvPr/>
+      </p:nvGrpSpPr>
+      <p:grpSpPr>
+        <a:xfrm>
+          <a:off x="0" y="0"/>
+          <a:ext cx="0" cy="0"/>
+          <a:chOff x="0" y="0"/>
+          <a:chExt cx="0" cy="0"/>
+        </a:xfrm>
+      </p:grpSpPr>
+      <p:sp>
+        <p:nvSpPr>
+          <p:cNvPr id="2" name="Slide Image Placeholder 1"/>
+          <p:cNvSpPr>
+            <a:spLocks noGrp="1" noRot="1" noChangeAspect="1"/>
+          </p:cNvSpPr>
+          <p:nvPr>
+            <p:ph type="sldImg"/>
+          </p:nvPr>
+        </p:nvSpPr>
+        <p:spPr/>
+      </p:sp>
+      <p:sp>
+        <p:nvSpPr>
+          <p:cNvPr id="3" name="Notes Placeholder 2"/>
+          <p:cNvSpPr>
+            <a:spLocks noGrp="1"/>
+          </p:cNvSpPr>
+          <p:nvPr>
+            <p:ph type="body" idx="1"/>
+          </p:nvPr>
+        </p:nvSpPr>
+        <p:spPr/>
+        <p:txBody>
+          <a:bodyPr/>
+          <a:lstStyle/>
+          <a:p>
+            <a:pPr lvl="0" marL="0" indent="0">
+              <a:buNone/>
+            </a:pPr>
+            <a:r>
+              <a:rPr/>
+              <a:t>This</a:t>
+            </a:r>
+            <a:r>
+              <a:rPr/>
+              <a:t> </a:t>
+            </a:r>
+            <a:r>
+              <a:rPr/>
+              <a:t>is</a:t>
+            </a:r>
+            <a:r>
+              <a:rPr/>
+              <a:t> </a:t>
+            </a:r>
+            <a:r>
+              <a:rPr/>
+              <a:t>the</a:t>
+            </a:r>
+            <a:r>
+              <a:rPr/>
+              <a:t> </a:t>
+            </a:r>
+            <a:r>
+              <a:rPr/>
+              <a:t>first</a:t>
+            </a:r>
+            <a:r>
+              <a:rPr/>
+              <a:t> </a:t>
+            </a:r>
+            <a:r>
+              <a:rPr/>
+              <a:t>few</a:t>
+            </a:r>
+            <a:r>
+              <a:rPr/>
+              <a:t> </a:t>
+            </a:r>
+            <a:r>
+              <a:rPr/>
+              <a:t>lines</a:t>
+            </a:r>
+            <a:r>
+              <a:rPr/>
+              <a:t> </a:t>
+            </a:r>
+            <a:r>
+              <a:rPr/>
+              <a:t>of</a:t>
+            </a:r>
+            <a:r>
+              <a:rPr/>
+              <a:t> </a:t>
+            </a:r>
+            <a:r>
+              <a:rPr/>
+              <a:t>code,</a:t>
+            </a:r>
+            <a:r>
+              <a:rPr/>
+              <a:t> </a:t>
+            </a:r>
+            <a:r>
+              <a:rPr/>
+              <a:t>showing</a:t>
+            </a:r>
+            <a:r>
+              <a:rPr/>
+              <a:t> </a:t>
+            </a:r>
+            <a:r>
+              <a:rPr/>
+              <a:t>where</a:t>
+            </a:r>
+            <a:r>
+              <a:rPr/>
+              <a:t> </a:t>
+            </a:r>
+            <a:r>
+              <a:rPr/>
+              <a:t>to</a:t>
+            </a:r>
+            <a:r>
+              <a:rPr/>
+              <a:t> </a:t>
+            </a:r>
+            <a:r>
+              <a:rPr/>
+              <a:t>store</a:t>
+            </a:r>
+            <a:r>
+              <a:rPr/>
+              <a:t> </a:t>
+            </a:r>
+            <a:r>
+              <a:rPr/>
+              <a:t>the</a:t>
+            </a:r>
+            <a:r>
+              <a:rPr/>
+              <a:t> </a:t>
+            </a:r>
+            <a:r>
+              <a:rPr/>
+              <a:t>output,</a:t>
+            </a:r>
+            <a:r>
+              <a:rPr/>
+              <a:t> </a:t>
+            </a:r>
+            <a:r>
+              <a:rPr/>
+              <a:t>where</a:t>
+            </a:r>
+            <a:r>
+              <a:rPr/>
+              <a:t> </a:t>
+            </a:r>
+            <a:r>
+              <a:rPr/>
+              <a:t>to</a:t>
+            </a:r>
+            <a:r>
+              <a:rPr/>
+              <a:t> </a:t>
+            </a:r>
+            <a:r>
+              <a:rPr/>
+              <a:t>find</a:t>
+            </a:r>
+            <a:r>
+              <a:rPr/>
+              <a:t> </a:t>
+            </a:r>
+            <a:r>
+              <a:rPr/>
+              <a:t>the</a:t>
+            </a:r>
+            <a:r>
+              <a:rPr/>
+              <a:t> </a:t>
+            </a:r>
+            <a:r>
+              <a:rPr/>
+              <a:t>input</a:t>
+            </a:r>
+            <a:r>
+              <a:rPr/>
+              <a:t> </a:t>
+            </a:r>
+            <a:r>
+              <a:rPr/>
+              <a:t>and</a:t>
+            </a:r>
+            <a:r>
+              <a:rPr/>
+              <a:t> </a:t>
+            </a:r>
+            <a:r>
+              <a:rPr/>
+              <a:t>where</a:t>
+            </a:r>
+            <a:r>
+              <a:rPr/>
+              <a:t> </a:t>
+            </a:r>
+            <a:r>
+              <a:rPr/>
+              <a:t>to</a:t>
+            </a:r>
+            <a:r>
+              <a:rPr/>
+              <a:t> </a:t>
+            </a:r>
+            <a:r>
+              <a:rPr/>
+              <a:t>store</a:t>
+            </a:r>
+            <a:r>
+              <a:rPr/>
+              <a:t> </a:t>
+            </a:r>
+            <a:r>
+              <a:rPr/>
+              <a:t>the</a:t>
+            </a:r>
+            <a:r>
+              <a:rPr/>
+              <a:t> </a:t>
+            </a:r>
+            <a:r>
+              <a:rPr/>
+              <a:t>SAS</a:t>
+            </a:r>
+            <a:r>
+              <a:rPr/>
+              <a:t> </a:t>
+            </a:r>
+            <a:r>
+              <a:rPr/>
+              <a:t>binary</a:t>
+            </a:r>
+            <a:r>
+              <a:rPr/>
+              <a:t> </a:t>
+            </a:r>
+            <a:r>
+              <a:rPr/>
+              <a:t>data</a:t>
+            </a:r>
+            <a:r>
+              <a:rPr/>
+              <a:t> </a:t>
+            </a:r>
+            <a:r>
+              <a:rPr/>
+              <a:t>set</a:t>
+            </a:r>
+            <a:r>
+              <a:rPr/>
+              <a:t> </a:t>
+            </a:r>
+            <a:r>
+              <a:rPr/>
+              <a:t>the</a:t>
+            </a:r>
+            <a:r>
+              <a:rPr/>
+              <a:t> </a:t>
+            </a:r>
+            <a:r>
+              <a:rPr/>
+              <a:t>program</a:t>
+            </a:r>
+            <a:r>
+              <a:rPr/>
+              <a:t> </a:t>
+            </a:r>
+            <a:r>
+              <a:rPr/>
+              <a:t>creates.</a:t>
+            </a:r>
+          </a:p>
+          <a:p>
+            <a:pPr lvl="0" marL="0" indent="0">
+              <a:buNone/>
+            </a:pPr>
+          </a:p>
+          <a:p>
+            <a:pPr lvl="0" marL="0" indent="0">
+              <a:buNone/>
+            </a:pPr>
+            <a:r>
+              <a:rPr/>
+              <a:t>Notice</a:t>
+            </a:r>
+            <a:r>
+              <a:rPr/>
+              <a:t> </a:t>
+            </a:r>
+            <a:r>
+              <a:rPr/>
+              <a:t>that</a:t>
+            </a:r>
+            <a:r>
+              <a:rPr/>
+              <a:t> </a:t>
+            </a:r>
+            <a:r>
+              <a:rPr/>
+              <a:t>the</a:t>
+            </a:r>
+            <a:r>
+              <a:rPr/>
+              <a:t> </a:t>
+            </a:r>
+            <a:r>
+              <a:rPr/>
+              <a:t>filename</a:t>
+            </a:r>
+            <a:r>
+              <a:rPr/>
+              <a:t> </a:t>
+            </a:r>
+            <a:r>
+              <a:rPr/>
+              <a:t>statement</a:t>
+            </a:r>
+            <a:r>
+              <a:rPr/>
+              <a:t> </a:t>
+            </a:r>
+            <a:r>
+              <a:rPr/>
+              <a:t>points</a:t>
+            </a:r>
+            <a:r>
+              <a:rPr/>
+              <a:t> </a:t>
+            </a:r>
+            <a:r>
+              <a:rPr/>
+              <a:t>directly</a:t>
+            </a:r>
+            <a:r>
+              <a:rPr/>
+              <a:t> </a:t>
+            </a:r>
+            <a:r>
+              <a:rPr/>
+              <a:t>to</a:t>
+            </a:r>
+            <a:r>
+              <a:rPr/>
+              <a:t> </a:t>
+            </a:r>
+            <a:r>
+              <a:rPr/>
+              <a:t>the</a:t>
+            </a:r>
+            <a:r>
+              <a:rPr/>
+              <a:t> </a:t>
+            </a:r>
+            <a:r>
+              <a:rPr/>
+              <a:t>website.</a:t>
+            </a:r>
+          </a:p>
+        </p:txBody>
+      </p:sp>
+      <p:sp>
+        <p:nvSpPr>
+          <p:cNvPr id="4" name="Slide Number Placeholder 3"/>
+          <p:cNvSpPr>
+            <a:spLocks noGrp="1"/>
+          </p:cNvSpPr>
+          <p:nvPr>
+            <p:ph type="sldNum" sz="quarter" idx="10"/>
+          </p:nvPr>
+        </p:nvSpPr>
+        <p:spPr/>
+        <p:txBody>
+          <a:bodyPr/>
+          <a:lstStyle/>
+          <a:p>
+            <a:fld id="{18BDFEC3-8487-43E8-A154-7C12CBC1FFF2}" type="slidenum">
+              <a:rPr lang="en-US"/>
+              <a:t>28</a:t>
+            </a:fld>
+            <a:endParaRPr lang="en-US"/>
+          </a:p>
+        </p:txBody>
+      </p:sp>
+    </p:spTree>
+  </p:cSld>
+</p:notes>
+</file>
+
+<file path=ppt/notesSlides/notesSlide23.xml><?xml version="1.0" encoding="utf-8"?>
+<p:notes xmlns:a="http://schemas.openxmlformats.org/drawingml/2006/main" xmlns:r="http://schemas.openxmlformats.org/officeDocument/2006/relationships" xmlns:p="http://schemas.openxmlformats.org/presentationml/2006/main">
+  <p:cSld>
+    <p:spTree>
+      <p:nvGrpSpPr>
+        <p:cNvPr id="1" name=""/>
+        <p:cNvGrpSpPr/>
+        <p:nvPr/>
+      </p:nvGrpSpPr>
+      <p:grpSpPr>
+        <a:xfrm>
+          <a:off x="0" y="0"/>
+          <a:ext cx="0" cy="0"/>
+          <a:chOff x="0" y="0"/>
+          <a:chExt cx="0" cy="0"/>
+        </a:xfrm>
+      </p:grpSpPr>
+      <p:sp>
+        <p:nvSpPr>
+          <p:cNvPr id="2" name="Slide Image Placeholder 1"/>
+          <p:cNvSpPr>
+            <a:spLocks noGrp="1" noRot="1" noChangeAspect="1"/>
+          </p:cNvSpPr>
+          <p:nvPr>
+            <p:ph type="sldImg"/>
+          </p:nvPr>
+        </p:nvSpPr>
+        <p:spPr/>
+      </p:sp>
+      <p:sp>
+        <p:nvSpPr>
+          <p:cNvPr id="3" name="Notes Placeholder 2"/>
+          <p:cNvSpPr>
+            <a:spLocks noGrp="1"/>
+          </p:cNvSpPr>
+          <p:nvPr>
+            <p:ph type="body" idx="1"/>
+          </p:nvPr>
+        </p:nvSpPr>
+        <p:spPr/>
+        <p:txBody>
+          <a:bodyPr/>
+          <a:lstStyle/>
+          <a:p>
+            <a:pPr lvl="0" marL="0" indent="0">
+              <a:buNone/>
+            </a:pPr>
+            <a:r>
+              <a:rPr/>
+              <a:t>This</a:t>
+            </a:r>
+            <a:r>
+              <a:rPr/>
+              <a:t> </a:t>
+            </a:r>
+            <a:r>
+              <a:rPr/>
+              <a:t>is</a:t>
+            </a:r>
+            <a:r>
+              <a:rPr/>
+              <a:t> </a:t>
+            </a:r>
+            <a:r>
+              <a:rPr/>
+              <a:t>a</a:t>
+            </a:r>
+            <a:r>
+              <a:rPr/>
+              <a:t> </a:t>
+            </a:r>
+            <a:r>
+              <a:rPr/>
+              <a:t>tab</a:t>
+            </a:r>
+            <a:r>
+              <a:rPr/>
+              <a:t> </a:t>
+            </a:r>
+            <a:r>
+              <a:rPr/>
+              <a:t>delimited</a:t>
+            </a:r>
+            <a:r>
+              <a:rPr/>
+              <a:t> </a:t>
+            </a:r>
+            <a:r>
+              <a:rPr/>
+              <a:t>file</a:t>
+            </a:r>
+            <a:r>
+              <a:rPr/>
+              <a:t> </a:t>
+            </a:r>
+            <a:r>
+              <a:rPr/>
+              <a:t>with</a:t>
+            </a:r>
+            <a:r>
+              <a:rPr/>
+              <a:t> </a:t>
+            </a:r>
+            <a:r>
+              <a:rPr/>
+              <a:t>variable</a:t>
+            </a:r>
+            <a:r>
+              <a:rPr/>
+              <a:t> </a:t>
+            </a:r>
+            <a:r>
+              <a:rPr/>
+              <a:t>names</a:t>
+            </a:r>
+            <a:r>
+              <a:rPr/>
+              <a:t> </a:t>
+            </a:r>
+            <a:r>
+              <a:rPr/>
+              <a:t>on</a:t>
+            </a:r>
+            <a:r>
+              <a:rPr/>
+              <a:t> </a:t>
+            </a:r>
+            <a:r>
+              <a:rPr/>
+              <a:t>the</a:t>
+            </a:r>
+            <a:r>
+              <a:rPr/>
+              <a:t> </a:t>
+            </a:r>
+            <a:r>
+              <a:rPr/>
+              <a:t>first</a:t>
+            </a:r>
+            <a:r>
+              <a:rPr/>
+              <a:t> </a:t>
+            </a:r>
+            <a:r>
+              <a:rPr/>
+              <a:t>row.</a:t>
+            </a:r>
+            <a:r>
+              <a:rPr/>
+              <a:t> </a:t>
+            </a:r>
+            <a:r>
+              <a:rPr/>
+              <a:t>So</a:t>
+            </a:r>
+            <a:r>
+              <a:rPr/>
+              <a:t> </a:t>
+            </a:r>
+            <a:r>
+              <a:rPr/>
+              <a:t>use</a:t>
+            </a:r>
+            <a:r>
+              <a:rPr/>
+              <a:t> </a:t>
+            </a:r>
+            <a:r>
+              <a:rPr/>
+              <a:t>proc</a:t>
+            </a:r>
+            <a:r>
+              <a:rPr/>
+              <a:t> </a:t>
+            </a:r>
+            <a:r>
+              <a:rPr/>
+              <a:t>import</a:t>
+            </a:r>
+            <a:r>
+              <a:rPr/>
+              <a:t> </a:t>
+            </a:r>
+            <a:r>
+              <a:rPr/>
+              <a:t>with</a:t>
+            </a:r>
+            <a:r>
+              <a:rPr/>
+              <a:t> </a:t>
+            </a:r>
+            <a:r>
+              <a:rPr/>
+              <a:t>the</a:t>
+            </a:r>
+            <a:r>
+              <a:rPr/>
+              <a:t> </a:t>
+            </a:r>
+            <a:r>
+              <a:rPr/>
+              <a:t>getnames=yes.</a:t>
+            </a:r>
+            <a:r>
+              <a:rPr/>
+              <a:t> </a:t>
+            </a:r>
+            <a:r>
+              <a:rPr/>
+              <a:t>The</a:t>
+            </a:r>
+            <a:r>
+              <a:rPr/>
+              <a:t> </a:t>
+            </a:r>
+            <a:r>
+              <a:rPr/>
+              <a:t>delimiter</a:t>
+            </a:r>
+            <a:r>
+              <a:rPr/>
+              <a:t> </a:t>
+            </a:r>
+            <a:r>
+              <a:rPr/>
+              <a:t>for</a:t>
+            </a:r>
+            <a:r>
+              <a:rPr/>
+              <a:t> </a:t>
+            </a:r>
+            <a:r>
+              <a:rPr/>
+              <a:t>tab</a:t>
+            </a:r>
+            <a:r>
+              <a:rPr/>
+              <a:t> </a:t>
+            </a:r>
+            <a:r>
+              <a:rPr/>
+              <a:t>is</a:t>
+            </a:r>
+            <a:r>
+              <a:rPr/>
+              <a:t> </a:t>
+            </a:r>
+            <a:r>
+              <a:rPr/>
+              <a:t>denoted</a:t>
+            </a:r>
+            <a:r>
+              <a:rPr/>
+              <a:t> </a:t>
+            </a:r>
+            <a:r>
+              <a:rPr/>
+              <a:t>by</a:t>
+            </a:r>
+            <a:r>
+              <a:rPr/>
+              <a:t> </a:t>
+            </a:r>
+            <a:r>
+              <a:rPr/>
+              <a:t>“</a:t>
+            </a:r>
+            <a:r>
+              <a:rPr/>
+              <a:t>09</a:t>
+            </a:r>
+            <a:r>
+              <a:rPr/>
+              <a:t>”</a:t>
+            </a:r>
+            <a:r>
+              <a:rPr/>
+              <a:t>x.</a:t>
+            </a:r>
+          </a:p>
+        </p:txBody>
+      </p:sp>
+      <p:sp>
+        <p:nvSpPr>
+          <p:cNvPr id="4" name="Slide Number Placeholder 3"/>
+          <p:cNvSpPr>
+            <a:spLocks noGrp="1"/>
+          </p:cNvSpPr>
+          <p:nvPr>
+            <p:ph type="sldNum" sz="quarter" idx="10"/>
+          </p:nvPr>
+        </p:nvSpPr>
+        <p:spPr/>
+        <p:txBody>
+          <a:bodyPr/>
+          <a:lstStyle/>
+          <a:p>
+            <a:fld id="{18BDFEC3-8487-43E8-A154-7C12CBC1FFF2}" type="slidenum">
+              <a:rPr lang="en-US"/>
+              <a:t>29</a:t>
+            </a:fld>
+            <a:endParaRPr lang="en-US"/>
+          </a:p>
+        </p:txBody>
+      </p:sp>
+    </p:spTree>
+  </p:cSld>
+</p:notes>
+</file>
+
+<file path=ppt/notesSlides/notesSlide24.xml><?xml version="1.0" encoding="utf-8"?>
+<p:notes xmlns:a="http://schemas.openxmlformats.org/drawingml/2006/main" xmlns:r="http://schemas.openxmlformats.org/officeDocument/2006/relationships" xmlns:p="http://schemas.openxmlformats.org/presentationml/2006/main">
+  <p:cSld>
+    <p:spTree>
+      <p:nvGrpSpPr>
+        <p:cNvPr id="1" name=""/>
+        <p:cNvGrpSpPr/>
+        <p:nvPr/>
+      </p:nvGrpSpPr>
+      <p:grpSpPr>
+        <a:xfrm>
+          <a:off x="0" y="0"/>
+          <a:ext cx="0" cy="0"/>
+          <a:chOff x="0" y="0"/>
+          <a:chExt cx="0" cy="0"/>
+        </a:xfrm>
+      </p:grpSpPr>
+      <p:sp>
+        <p:nvSpPr>
+          <p:cNvPr id="2" name="Slide Image Placeholder 1"/>
+          <p:cNvSpPr>
+            <a:spLocks noGrp="1" noRot="1" noChangeAspect="1"/>
+          </p:cNvSpPr>
+          <p:nvPr>
+            <p:ph type="sldImg"/>
+          </p:nvPr>
+        </p:nvSpPr>
+        <p:spPr/>
+      </p:sp>
+      <p:sp>
+        <p:nvSpPr>
+          <p:cNvPr id="3" name="Notes Placeholder 2"/>
+          <p:cNvSpPr>
+            <a:spLocks noGrp="1"/>
+          </p:cNvSpPr>
+          <p:nvPr>
+            <p:ph type="body" idx="1"/>
+          </p:nvPr>
+        </p:nvSpPr>
+        <p:spPr/>
+        <p:txBody>
+          <a:bodyPr/>
+          <a:lstStyle/>
+          <a:p>
+            <a:pPr lvl="0" marL="0" indent="0">
+              <a:buNone/>
+            </a:pPr>
+            <a:r>
+              <a:rPr/>
+              <a:t>If</a:t>
+            </a:r>
+            <a:r>
+              <a:rPr/>
+              <a:t> </a:t>
+            </a:r>
+            <a:r>
+              <a:rPr/>
+              <a:t>the</a:t>
+            </a:r>
+            <a:r>
+              <a:rPr/>
+              <a:t> </a:t>
+            </a:r>
+            <a:r>
+              <a:rPr/>
+              <a:t>import</a:t>
+            </a:r>
+            <a:r>
+              <a:rPr/>
+              <a:t> </a:t>
+            </a:r>
+            <a:r>
+              <a:rPr/>
+              <a:t>is</a:t>
+            </a:r>
+            <a:r>
+              <a:rPr/>
+              <a:t> </a:t>
+            </a:r>
+            <a:r>
+              <a:rPr/>
+              <a:t>successful,</a:t>
+            </a:r>
+            <a:r>
+              <a:rPr/>
+              <a:t> </a:t>
+            </a:r>
+            <a:r>
+              <a:rPr/>
+              <a:t>you</a:t>
+            </a:r>
+            <a:r>
+              <a:rPr/>
+              <a:t> </a:t>
+            </a:r>
+            <a:r>
+              <a:rPr/>
+              <a:t>will</a:t>
+            </a:r>
+            <a:r>
+              <a:rPr/>
+              <a:t> </a:t>
+            </a:r>
+            <a:r>
+              <a:rPr/>
+              <a:t>see</a:t>
+            </a:r>
+            <a:r>
+              <a:rPr/>
+              <a:t> </a:t>
+            </a:r>
+            <a:r>
+              <a:rPr/>
+              <a:t>a</a:t>
+            </a:r>
+            <a:r>
+              <a:rPr/>
+              <a:t> </a:t>
+            </a:r>
+            <a:r>
+              <a:rPr/>
+              <a:t>small</a:t>
+            </a:r>
+            <a:r>
+              <a:rPr/>
+              <a:t> </a:t>
+            </a:r>
+            <a:r>
+              <a:rPr/>
+              <a:t>part</a:t>
+            </a:r>
+            <a:r>
+              <a:rPr/>
+              <a:t> </a:t>
+            </a:r>
+            <a:r>
+              <a:rPr/>
+              <a:t>of</a:t>
+            </a:r>
+            <a:r>
+              <a:rPr/>
+              <a:t> </a:t>
+            </a:r>
+            <a:r>
+              <a:rPr/>
+              <a:t>the</a:t>
+            </a:r>
+            <a:r>
+              <a:rPr/>
+              <a:t> </a:t>
+            </a:r>
+            <a:r>
+              <a:rPr/>
+              <a:t>data:</a:t>
+            </a:r>
+            <a:r>
+              <a:rPr/>
+              <a:t> </a:t>
+            </a:r>
+            <a:r>
+              <a:rPr/>
+              <a:t>the</a:t>
+            </a:r>
+            <a:r>
+              <a:rPr/>
+              <a:t> </a:t>
+            </a:r>
+            <a:r>
+              <a:rPr/>
+              <a:t>first</a:t>
+            </a:r>
+            <a:r>
+              <a:rPr/>
+              <a:t> </a:t>
+            </a:r>
+            <a:r>
+              <a:rPr/>
+              <a:t>ten</a:t>
+            </a:r>
+            <a:r>
+              <a:rPr/>
+              <a:t> </a:t>
+            </a:r>
+            <a:r>
+              <a:rPr/>
+              <a:t>rows</a:t>
+            </a:r>
+            <a:r>
+              <a:rPr/>
+              <a:t> </a:t>
+            </a:r>
+            <a:r>
+              <a:rPr/>
+              <a:t>and</a:t>
+            </a:r>
+            <a:r>
+              <a:rPr/>
+              <a:t> </a:t>
+            </a:r>
+            <a:r>
+              <a:rPr/>
+              <a:t>the</a:t>
+            </a:r>
+            <a:r>
+              <a:rPr/>
+              <a:t> </a:t>
+            </a:r>
+            <a:r>
+              <a:rPr/>
+              <a:t>first</a:t>
+            </a:r>
+            <a:r>
+              <a:rPr/>
+              <a:t> </a:t>
+            </a:r>
+            <a:r>
+              <a:rPr/>
+              <a:t>five</a:t>
+            </a:r>
+            <a:r>
+              <a:rPr/>
+              <a:t> </a:t>
+            </a:r>
+            <a:r>
+              <a:rPr/>
+              <a:t>variables.</a:t>
+            </a:r>
+          </a:p>
+        </p:txBody>
+      </p:sp>
+      <p:sp>
+        <p:nvSpPr>
+          <p:cNvPr id="4" name="Slide Number Placeholder 3"/>
+          <p:cNvSpPr>
+            <a:spLocks noGrp="1"/>
+          </p:cNvSpPr>
+          <p:nvPr>
+            <p:ph type="sldNum" sz="quarter" idx="10"/>
+          </p:nvPr>
+        </p:nvSpPr>
+        <p:spPr/>
+        <p:txBody>
+          <a:bodyPr/>
+          <a:lstStyle/>
+          <a:p>
+            <a:fld id="{18BDFEC3-8487-43E8-A154-7C12CBC1FFF2}" type="slidenum">
+              <a:rPr lang="en-US"/>
+              <a:t>30</a:t>
             </a:fld>
             <a:endParaRPr lang="en-US"/>
           </a:p>
@@ -15918,6 +18125,30 @@
               <a:rPr/>
               <a:t>files</a:t>
             </a:r>
+            <a:r>
+              <a:rPr/>
+              <a:t> </a:t>
+            </a:r>
+            <a:r>
+              <a:rPr/>
+              <a:t>(1</a:t>
+            </a:r>
+            <a:r>
+              <a:rPr/>
+              <a:t> </a:t>
+            </a:r>
+            <a:r>
+              <a:rPr/>
+              <a:t>of</a:t>
+            </a:r>
+            <a:r>
+              <a:rPr/>
+              <a:t> </a:t>
+            </a:r>
+            <a:r>
+              <a:rPr/>
+              <a:t>2)</a:t>
+            </a:r>
           </a:p>
         </p:txBody>
       </p:sp>
@@ -15936,43 +18167,951 @@
           <a:bodyPr/>
           <a:lstStyle/>
           <a:p>
+            <a:pPr lvl="1"/>
+            <a:r>
+              <a:rPr/>
+              <a:t>Saratoga house prices</a:t>
+            </a:r>
+          </a:p>
+          <a:p>
+            <a:pPr lvl="2"/>
+            <a:r>
+              <a:rPr/>
+              <a:t>This is a tab delimited file with the names of the variables in the first row. The second link provides a brief description of the data.</a:t>
+            </a:r>
+          </a:p>
+          <a:p>
+            <a:pPr lvl="3"/>
+            <a:r>
+              <a:rPr>
+                <a:hlinkClick r:id="rId2"/>
+              </a:rPr>
+              <a:t>https://dasl.datadescription.com/download/data/3437</a:t>
+            </a:r>
+          </a:p>
+          <a:p>
+            <a:pPr lvl="3"/>
+            <a:r>
+              <a:rPr>
+                <a:hlinkClick r:id="rId3"/>
+              </a:rPr>
+              <a:t>https://dasl.datadescription.com/datafile/saratoga-house-prices/</a:t>
+            </a:r>
+          </a:p>
+          <a:p>
+            <a:pPr lvl="1"/>
+            <a:r>
+              <a:rPr/>
+              <a:t>Abalone age prediction</a:t>
+            </a:r>
+          </a:p>
+          <a:p>
+            <a:pPr lvl="2"/>
+            <a:r>
+              <a:rPr/>
+              <a:t>This is a comma separated value file without variables names at the top. You can find the variable names in a data dictionary published at second link.</a:t>
+            </a:r>
+          </a:p>
+          <a:p>
+            <a:pPr lvl="3"/>
+            <a:r>
+              <a:rPr>
+                <a:hlinkClick r:id="rId4"/>
+              </a:rPr>
+              <a:t>https://archive.ics.uci.edu/ml/machine-learning-databases/abalone/abalone.data</a:t>
+            </a:r>
+          </a:p>
+          <a:p>
+            <a:pPr lvl="3"/>
+            <a:r>
+              <a:rPr>
+                <a:hlinkClick r:id="rId5"/>
+              </a:rPr>
+              <a:t>https://archive.ics.uci.edu/ml/machine-learning-databases/abalone/abalone.names</a:t>
+            </a:r>
+          </a:p>
+        </p:txBody>
+      </p:sp>
+    </p:spTree>
+  </p:cSld>
+</p:sld>
+</file>
+
+<file path=ppt/slides/slide22.xml><?xml version="1.0" encoding="utf-8"?>
+<p:sld xmlns:a="http://schemas.openxmlformats.org/drawingml/2006/main" xmlns:r="http://schemas.openxmlformats.org/officeDocument/2006/relationships" xmlns:p="http://schemas.openxmlformats.org/presentationml/2006/main">
+  <p:cSld>
+    <p:spTree>
+      <p:nvGrpSpPr>
+        <p:cNvPr id="1" name=""/>
+        <p:cNvGrpSpPr/>
+        <p:nvPr/>
+      </p:nvGrpSpPr>
+      <p:grpSpPr>
+        <a:xfrm>
+          <a:off x="0" y="0"/>
+          <a:ext cx="0" cy="0"/>
+          <a:chOff x="0" y="0"/>
+          <a:chExt cx="0" cy="0"/>
+        </a:xfrm>
+      </p:grpSpPr>
+      <p:sp>
+        <p:nvSpPr>
+          <p:cNvPr id="2" name="Title 1"/>
+          <p:cNvSpPr>
+            <a:spLocks noGrp="1"/>
+          </p:cNvSpPr>
+          <p:nvPr>
+            <p:ph type="title"/>
+          </p:nvPr>
+        </p:nvSpPr>
+        <p:spPr/>
+        <p:txBody>
+          <a:bodyPr/>
+          <a:lstStyle/>
+          <a:p>
             <a:pPr lvl="0" marL="0" indent="0">
               <a:buNone/>
             </a:pPr>
             <a:r>
+              <a:rPr/>
+              <a:t>Read</a:t>
+            </a:r>
+            <a:r>
+              <a:rPr/>
+              <a:t> </a:t>
+            </a:r>
+            <a:r>
+              <a:rPr/>
+              <a:t>in</a:t>
+            </a:r>
+            <a:r>
+              <a:rPr/>
+              <a:t> </a:t>
+            </a:r>
+            <a:r>
+              <a:rPr/>
+              <a:t>these</a:t>
+            </a:r>
+            <a:r>
+              <a:rPr/>
+              <a:t> </a:t>
+            </a:r>
+            <a:r>
+              <a:rPr/>
+              <a:t>files</a:t>
+            </a:r>
+            <a:r>
+              <a:rPr/>
+              <a:t> </a:t>
+            </a:r>
+            <a:r>
+              <a:rPr/>
+              <a:t>(2</a:t>
+            </a:r>
+            <a:r>
+              <a:rPr/>
+              <a:t> </a:t>
+            </a:r>
+            <a:r>
+              <a:rPr/>
+              <a:t>of</a:t>
+            </a:r>
+            <a:r>
+              <a:rPr/>
+              <a:t> </a:t>
+            </a:r>
+            <a:r>
+              <a:rPr/>
+              <a:t>2)</a:t>
+            </a:r>
+          </a:p>
+        </p:txBody>
+      </p:sp>
+      <p:sp>
+        <p:nvSpPr>
+          <p:cNvPr id="3" name="Content Placeholder 2"/>
+          <p:cNvSpPr>
+            <a:spLocks noGrp="1"/>
+          </p:cNvSpPr>
+          <p:nvPr>
+            <p:ph idx="1"/>
+          </p:nvPr>
+        </p:nvSpPr>
+        <p:spPr/>
+        <p:txBody>
+          <a:bodyPr/>
+          <a:lstStyle/>
+          <a:p>
+            <a:pPr lvl="1"/>
+            <a:r>
+              <a:rPr/>
+              <a:t>Airline safety</a:t>
+            </a:r>
+          </a:p>
+          <a:p>
+            <a:pPr lvl="2"/>
+            <a:r>
+              <a:rPr/>
+              <a:t>This is a comma separated value file with variable names at the top.</a:t>
+            </a:r>
+          </a:p>
+          <a:p>
+            <a:pPr lvl="3"/>
+            <a:r>
               <a:rPr>
                 <a:hlinkClick r:id="rId2"/>
               </a:rPr>
-              <a:t>https://dasl.datadescription.com/datafile/saratoga-house-prices/</a:t>
-            </a:r>
-          </a:p>
+              <a:t>https://raw.githubusercontent.com/fivethirtyeight/data/master/airline-safety/airline-safety.csv</a:t>
+            </a:r>
+          </a:p>
+        </p:txBody>
+      </p:sp>
+    </p:spTree>
+  </p:cSld>
+</p:sld>
+</file>
+
+<file path=ppt/slides/slide23.xml><?xml version="1.0" encoding="utf-8"?>
+<p:sld xmlns:a="http://schemas.openxmlformats.org/drawingml/2006/main" xmlns:r="http://schemas.openxmlformats.org/officeDocument/2006/relationships" xmlns:p="http://schemas.openxmlformats.org/presentationml/2006/main">
+  <p:cSld>
+    <p:spTree>
+      <p:nvGrpSpPr>
+        <p:cNvPr id="1" name=""/>
+        <p:cNvGrpSpPr/>
+        <p:nvPr/>
+      </p:nvGrpSpPr>
+      <p:grpSpPr>
+        <a:xfrm>
+          <a:off x="0" y="0"/>
+          <a:ext cx="0" cy="0"/>
+          <a:chOff x="0" y="0"/>
+          <a:chExt cx="0" cy="0"/>
+        </a:xfrm>
+      </p:grpSpPr>
+      <p:sp>
+        <p:nvSpPr>
+          <p:cNvPr id="2" name="Title 1"/>
+          <p:cNvSpPr>
+            <a:spLocks noGrp="1"/>
+          </p:cNvSpPr>
+          <p:nvPr>
+            <p:ph type="title"/>
+          </p:nvPr>
+        </p:nvSpPr>
+        <p:spPr/>
+        <p:txBody>
+          <a:bodyPr/>
+          <a:lstStyle/>
           <a:p>
             <a:pPr lvl="0" marL="0" indent="0">
               <a:buNone/>
             </a:pPr>
             <a:r>
               <a:rPr/>
-              <a:t>This is a tab delimited file with the names of the variables in the first row.</a:t>
-            </a:r>
-          </a:p>
+              <a:t>abalone</a:t>
+            </a:r>
+            <a:r>
+              <a:rPr/>
+              <a:t> </a:t>
+            </a:r>
+            <a:r>
+              <a:rPr/>
+              <a:t>data,</a:t>
+            </a:r>
+            <a:r>
+              <a:rPr/>
+              <a:t> </a:t>
+            </a:r>
+            <a:r>
+              <a:rPr/>
+              <a:t>first</a:t>
+            </a:r>
+            <a:r>
+              <a:rPr/>
+              <a:t> </a:t>
+            </a:r>
+            <a:r>
+              <a:rPr/>
+              <a:t>ten</a:t>
+            </a:r>
+            <a:r>
+              <a:rPr/>
+              <a:t> </a:t>
+            </a:r>
+            <a:r>
+              <a:rPr/>
+              <a:t>lines</a:t>
+            </a:r>
+          </a:p>
+        </p:txBody>
+      </p:sp>
+      <p:sp>
+        <p:nvSpPr>
+          <p:cNvPr id="3" name="Content Placeholder 2"/>
+          <p:cNvSpPr>
+            <a:spLocks noGrp="1"/>
+          </p:cNvSpPr>
+          <p:nvPr>
+            <p:ph idx="1"/>
+          </p:nvPr>
+        </p:nvSpPr>
+        <p:spPr/>
+        <p:txBody>
+          <a:bodyPr/>
+          <a:lstStyle/>
+          <a:p>
+            <a:pPr lvl="0" marL="1270000" indent="0">
+              <a:buNone/>
+            </a:pPr>
+            <a:r>
+              <a:rPr sz="1800">
+                <a:latin typeface="Courier"/>
+              </a:rPr>
+              <a:t>M,0.455,0.365,0.095,0.514,0.2245,0.101,0.15,15
+M,0.35,0.265,0.09,0.2255,0.0995,0.0485,0.07,7
+F,0.53,0.42,0.135,0.677,0.2565,0.1415,0.21,9
+M,0.44,0.365,0.125,0.516,0.2155,0.114,0.155,10
+I,0.33,0.255,0.08,0.205,0.0895,0.0395,0.055,7
+I,0.425,0.3,0.095,0.3515,0.141,0.0775,0.12,8
+F,0.53,0.415,0.15,0.7775,0.237,0.1415,0.33,20
+F,0.545,0.425,0.125,0.768,0.294,0.1495,0.26,16
+M,0.475,0.37,0.125,0.5095,0.2165,0.1125,0.165,9
+F,0.55,0.44,0.15,0.8945,0.3145,0.151,0.32,19</a:t>
+            </a:r>
+          </a:p>
+        </p:txBody>
+      </p:sp>
+    </p:spTree>
+  </p:cSld>
+</p:sld>
+</file>
+
+<file path=ppt/slides/slide24.xml><?xml version="1.0" encoding="utf-8"?>
+<p:sld xmlns:a="http://schemas.openxmlformats.org/drawingml/2006/main" xmlns:r="http://schemas.openxmlformats.org/officeDocument/2006/relationships" xmlns:p="http://schemas.openxmlformats.org/presentationml/2006/main">
+  <p:cSld>
+    <p:spTree>
+      <p:nvGrpSpPr>
+        <p:cNvPr id="1" name=""/>
+        <p:cNvGrpSpPr/>
+        <p:nvPr/>
+      </p:nvGrpSpPr>
+      <p:grpSpPr>
+        <a:xfrm>
+          <a:off x="0" y="0"/>
+          <a:ext cx="0" cy="0"/>
+          <a:chOff x="0" y="0"/>
+          <a:chExt cx="0" cy="0"/>
+        </a:xfrm>
+      </p:grpSpPr>
+      <p:sp>
+        <p:nvSpPr>
+          <p:cNvPr id="2" name="Title 1"/>
+          <p:cNvSpPr>
+            <a:spLocks noGrp="1"/>
+          </p:cNvSpPr>
+          <p:nvPr>
+            <p:ph type="title"/>
+          </p:nvPr>
+        </p:nvSpPr>
+        <p:spPr/>
+        <p:txBody>
+          <a:bodyPr/>
+          <a:lstStyle/>
           <a:p>
             <a:pPr lvl="0" marL="0" indent="0">
               <a:buNone/>
             </a:pPr>
             <a:r>
-              <a:rPr>
-                <a:hlinkClick r:id="rId3"/>
+              <a:rPr/>
+              <a:t>import-abalone.sas</a:t>
+            </a:r>
+            <a:r>
+              <a:rPr/>
+              <a:t> </a:t>
+            </a:r>
+            <a:r>
+              <a:rPr/>
+              <a:t>(1</a:t>
+            </a:r>
+            <a:r>
+              <a:rPr/>
+              <a:t> </a:t>
+            </a:r>
+            <a:r>
+              <a:rPr/>
+              <a:t>of</a:t>
+            </a:r>
+            <a:r>
+              <a:rPr/>
+              <a:t> </a:t>
+            </a:r>
+            <a:r>
+              <a:rPr/>
+              <a:t>3)</a:t>
+            </a:r>
+          </a:p>
+        </p:txBody>
+      </p:sp>
+      <p:sp>
+        <p:nvSpPr>
+          <p:cNvPr id="3" name="Content Placeholder 2"/>
+          <p:cNvSpPr>
+            <a:spLocks noGrp="1"/>
+          </p:cNvSpPr>
+          <p:nvPr>
+            <p:ph idx="1"/>
+          </p:nvPr>
+        </p:nvSpPr>
+        <p:spPr/>
+        <p:txBody>
+          <a:bodyPr/>
+          <a:lstStyle/>
+          <a:p>
+            <a:pPr lvl="0" marL="1270000" indent="0">
+              <a:buNone/>
+            </a:pPr>
+            <a:r>
+              <a:rPr sz="1800">
+                <a:latin typeface="Courier"/>
               </a:rPr>
-              <a:t>https://raw.githubusercontent.com/fivethirtyeight/data/master/airline-safety/airline-safety.csv</a:t>
-            </a:r>
-          </a:p>
+              <a:t>ods pdf file="../results/import-abalone.pdf";
+filename raw_data
+  "https://archive.ics.uci.edu/ml/machine-learning-databases/abalone/abalone.data";
+libname module01
+  "../data";</a:t>
+            </a:r>
+          </a:p>
+        </p:txBody>
+      </p:sp>
+    </p:spTree>
+  </p:cSld>
+</p:sld>
+</file>
+
+<file path=ppt/slides/slide25.xml><?xml version="1.0" encoding="utf-8"?>
+<p:sld xmlns:a="http://schemas.openxmlformats.org/drawingml/2006/main" xmlns:r="http://schemas.openxmlformats.org/officeDocument/2006/relationships" xmlns:p="http://schemas.openxmlformats.org/presentationml/2006/main">
+  <p:cSld>
+    <p:spTree>
+      <p:nvGrpSpPr>
+        <p:cNvPr id="1" name=""/>
+        <p:cNvGrpSpPr/>
+        <p:nvPr/>
+      </p:nvGrpSpPr>
+      <p:grpSpPr>
+        <a:xfrm>
+          <a:off x="0" y="0"/>
+          <a:ext cx="0" cy="0"/>
+          <a:chOff x="0" y="0"/>
+          <a:chExt cx="0" cy="0"/>
+        </a:xfrm>
+      </p:grpSpPr>
+      <p:sp>
+        <p:nvSpPr>
+          <p:cNvPr id="2" name="Title 1"/>
+          <p:cNvSpPr>
+            <a:spLocks noGrp="1"/>
+          </p:cNvSpPr>
+          <p:nvPr>
+            <p:ph type="title"/>
+          </p:nvPr>
+        </p:nvSpPr>
+        <p:spPr/>
+        <p:txBody>
+          <a:bodyPr/>
+          <a:lstStyle/>
           <a:p>
             <a:pPr lvl="0" marL="0" indent="0">
               <a:buNone/>
             </a:pPr>
             <a:r>
               <a:rPr/>
-              <a:t>This is a comma separated value file with variable names at the top.</a:t>
+              <a:t>import-abalone.sas</a:t>
+            </a:r>
+            <a:r>
+              <a:rPr/>
+              <a:t> </a:t>
+            </a:r>
+            <a:r>
+              <a:rPr/>
+              <a:t>(2</a:t>
+            </a:r>
+            <a:r>
+              <a:rPr/>
+              <a:t> </a:t>
+            </a:r>
+            <a:r>
+              <a:rPr/>
+              <a:t>of</a:t>
+            </a:r>
+            <a:r>
+              <a:rPr/>
+              <a:t> </a:t>
+            </a:r>
+            <a:r>
+              <a:rPr/>
+              <a:t>3)</a:t>
+            </a:r>
+          </a:p>
+        </p:txBody>
+      </p:sp>
+      <p:sp>
+        <p:nvSpPr>
+          <p:cNvPr id="3" name="Content Placeholder 2"/>
+          <p:cNvSpPr>
+            <a:spLocks noGrp="1"/>
+          </p:cNvSpPr>
+          <p:nvPr>
+            <p:ph idx="1"/>
+          </p:nvPr>
+        </p:nvSpPr>
+        <p:spPr/>
+        <p:txBody>
+          <a:bodyPr/>
+          <a:lstStyle/>
+          <a:p>
+            <a:pPr lvl="0" marL="1270000" indent="0">
+              <a:buNone/>
+            </a:pPr>
+            <a:r>
+              <a:rPr sz="1800">
+                <a:latin typeface="Courier"/>
+              </a:rPr>
+              <a:t>data module01.abalone;
+  infile raw_data delimiter=",";
+  input
+    Sex $
+    Length
+    Diameter
+    Height
+    Whole_weight
+    Shucked_weight
+    Viscera_weight
+    Shell_weight
+    Rings;
+run;</a:t>
+            </a:r>
+          </a:p>
+        </p:txBody>
+      </p:sp>
+    </p:spTree>
+  </p:cSld>
+</p:sld>
+</file>
+
+<file path=ppt/slides/slide26.xml><?xml version="1.0" encoding="utf-8"?>
+<p:sld xmlns:a="http://schemas.openxmlformats.org/drawingml/2006/main" xmlns:r="http://schemas.openxmlformats.org/officeDocument/2006/relationships" xmlns:p="http://schemas.openxmlformats.org/presentationml/2006/main">
+  <p:cSld>
+    <p:spTree>
+      <p:nvGrpSpPr>
+        <p:cNvPr id="1" name=""/>
+        <p:cNvGrpSpPr/>
+        <p:nvPr/>
+      </p:nvGrpSpPr>
+      <p:grpSpPr>
+        <a:xfrm>
+          <a:off x="0" y="0"/>
+          <a:ext cx="0" cy="0"/>
+          <a:chOff x="0" y="0"/>
+          <a:chExt cx="0" cy="0"/>
+        </a:xfrm>
+      </p:grpSpPr>
+      <p:sp>
+        <p:nvSpPr>
+          <p:cNvPr id="2" name="Title 1"/>
+          <p:cNvSpPr>
+            <a:spLocks noGrp="1"/>
+          </p:cNvSpPr>
+          <p:nvPr>
+            <p:ph type="title"/>
+          </p:nvPr>
+        </p:nvSpPr>
+        <p:spPr/>
+        <p:txBody>
+          <a:bodyPr/>
+          <a:lstStyle/>
+          <a:p>
+            <a:pPr lvl="0" marL="0" indent="0">
+              <a:buNone/>
+            </a:pPr>
+            <a:r>
+              <a:rPr/>
+              <a:t>import-abalone.sas</a:t>
+            </a:r>
+            <a:r>
+              <a:rPr/>
+              <a:t> </a:t>
+            </a:r>
+            <a:r>
+              <a:rPr/>
+              <a:t>(3</a:t>
+            </a:r>
+            <a:r>
+              <a:rPr/>
+              <a:t> </a:t>
+            </a:r>
+            <a:r>
+              <a:rPr/>
+              <a:t>of</a:t>
+            </a:r>
+            <a:r>
+              <a:rPr/>
+              <a:t> </a:t>
+            </a:r>
+            <a:r>
+              <a:rPr/>
+              <a:t>3)</a:t>
+            </a:r>
+          </a:p>
+        </p:txBody>
+      </p:sp>
+      <p:sp>
+        <p:nvSpPr>
+          <p:cNvPr id="3" name="Content Placeholder 2"/>
+          <p:cNvSpPr>
+            <a:spLocks noGrp="1"/>
+          </p:cNvSpPr>
+          <p:nvPr>
+            <p:ph idx="1"/>
+          </p:nvPr>
+        </p:nvSpPr>
+        <p:spPr/>
+        <p:txBody>
+          <a:bodyPr/>
+          <a:lstStyle/>
+          <a:p>
+            <a:pPr lvl="0" marL="1270000" indent="0">
+              <a:buNone/>
+            </a:pPr>
+            <a:r>
+              <a:rPr sz="1800">
+                <a:latin typeface="Courier"/>
+              </a:rPr>
+              <a:t>proc print
+    data=module01.abalone(obs=10);
+  var Sex Length Diameter Height Whole_weight;
+  title1 "First ten rows of data";
+run;
+ods pdf close;</a:t>
+            </a:r>
+          </a:p>
+        </p:txBody>
+      </p:sp>
+    </p:spTree>
+  </p:cSld>
+</p:sld>
+</file>
+
+<file path=ppt/slides/slide27.xml><?xml version="1.0" encoding="utf-8"?>
+<p:sld xmlns:a="http://schemas.openxmlformats.org/drawingml/2006/main" xmlns:r="http://schemas.openxmlformats.org/officeDocument/2006/relationships" xmlns:p="http://schemas.openxmlformats.org/presentationml/2006/main">
+  <p:cSld>
+    <p:spTree>
+      <p:nvGrpSpPr>
+        <p:cNvPr id="1" name=""/>
+        <p:cNvGrpSpPr/>
+        <p:nvPr/>
+      </p:nvGrpSpPr>
+      <p:grpSpPr>
+        <a:xfrm>
+          <a:off x="0" y="0"/>
+          <a:ext cx="0" cy="0"/>
+          <a:chOff x="0" y="0"/>
+          <a:chExt cx="0" cy="0"/>
+        </a:xfrm>
+      </p:grpSpPr>
+      <p:sp>
+        <p:nvSpPr>
+          <p:cNvPr id="2" name="Title 1"/>
+          <p:cNvSpPr>
+            <a:spLocks noGrp="1"/>
+          </p:cNvSpPr>
+          <p:nvPr>
+            <p:ph type="title"/>
+          </p:nvPr>
+        </p:nvSpPr>
+        <p:spPr/>
+        <p:txBody>
+          <a:bodyPr/>
+          <a:lstStyle/>
+          <a:p>
+            <a:pPr lvl="0" marL="0" indent="0">
+              <a:buNone/>
+            </a:pPr>
+            <a:r>
+              <a:rPr/>
+              <a:t>saratoga</a:t>
+            </a:r>
+            <a:r>
+              <a:rPr/>
+              <a:t> </a:t>
+            </a:r>
+            <a:r>
+              <a:rPr/>
+              <a:t>data,</a:t>
+            </a:r>
+            <a:r>
+              <a:rPr/>
+              <a:t> </a:t>
+            </a:r>
+            <a:r>
+              <a:rPr/>
+              <a:t>first</a:t>
+            </a:r>
+            <a:r>
+              <a:rPr/>
+              <a:t> </a:t>
+            </a:r>
+            <a:r>
+              <a:rPr/>
+              <a:t>ten</a:t>
+            </a:r>
+            <a:r>
+              <a:rPr/>
+              <a:t> </a:t>
+            </a:r>
+            <a:r>
+              <a:rPr/>
+              <a:t>lines</a:t>
+            </a:r>
+          </a:p>
+        </p:txBody>
+      </p:sp>
+      <p:sp>
+        <p:nvSpPr>
+          <p:cNvPr id="3" name="Content Placeholder 2"/>
+          <p:cNvSpPr>
+            <a:spLocks noGrp="1"/>
+          </p:cNvSpPr>
+          <p:nvPr>
+            <p:ph idx="1"/>
+          </p:nvPr>
+        </p:nvSpPr>
+        <p:spPr/>
+        <p:txBody>
+          <a:bodyPr/>
+          <a:lstStyle/>
+          <a:p>
+            <a:pPr lvl="0" marL="1270000" indent="0">
+              <a:buNone/>
+            </a:pPr>
+            <a:r>
+              <a:rPr sz="1800">
+                <a:latin typeface="Courier"/>
+              </a:rPr>
+              <a:t>Price   Size    Baths   Bedrooms    Fireplace   Acres   Age
+142.21200   1.9820000   1   3   0   2   133
+134.86500   1.6760000   1.5 3   1   0.38    14
+118.00700   1.6940000   2   3   1   0.96    15
+138.29700   1.8000000   1   2   1   0.48    49
+129.47000   2.0880000   1   3   1   1.84    29
+206.51200   1.4560000   2   3   0   0.98    10
+50.709000   0.96000000  1.5 2   0   0.01    12
+108.79400   1.4640000   1   2   0   0.11    87
+68.353000   1.2160000   1   2   0   0.61    101</a:t>
+            </a:r>
+          </a:p>
+        </p:txBody>
+      </p:sp>
+    </p:spTree>
+  </p:cSld>
+</p:sld>
+</file>
+
+<file path=ppt/slides/slide28.xml><?xml version="1.0" encoding="utf-8"?>
+<p:sld xmlns:a="http://schemas.openxmlformats.org/drawingml/2006/main" xmlns:r="http://schemas.openxmlformats.org/officeDocument/2006/relationships" xmlns:p="http://schemas.openxmlformats.org/presentationml/2006/main">
+  <p:cSld>
+    <p:spTree>
+      <p:nvGrpSpPr>
+        <p:cNvPr id="1" name=""/>
+        <p:cNvGrpSpPr/>
+        <p:nvPr/>
+      </p:nvGrpSpPr>
+      <p:grpSpPr>
+        <a:xfrm>
+          <a:off x="0" y="0"/>
+          <a:ext cx="0" cy="0"/>
+          <a:chOff x="0" y="0"/>
+          <a:chExt cx="0" cy="0"/>
+        </a:xfrm>
+      </p:grpSpPr>
+      <p:sp>
+        <p:nvSpPr>
+          <p:cNvPr id="2" name="Title 1"/>
+          <p:cNvSpPr>
+            <a:spLocks noGrp="1"/>
+          </p:cNvSpPr>
+          <p:nvPr>
+            <p:ph type="title"/>
+          </p:nvPr>
+        </p:nvSpPr>
+        <p:spPr/>
+        <p:txBody>
+          <a:bodyPr/>
+          <a:lstStyle/>
+          <a:p>
+            <a:pPr lvl="0" marL="0" indent="0">
+              <a:buNone/>
+            </a:pPr>
+            <a:r>
+              <a:rPr/>
+              <a:t>import-saratoga.sas</a:t>
+            </a:r>
+            <a:r>
+              <a:rPr/>
+              <a:t> </a:t>
+            </a:r>
+            <a:r>
+              <a:rPr/>
+              <a:t>(1</a:t>
+            </a:r>
+            <a:r>
+              <a:rPr/>
+              <a:t> </a:t>
+            </a:r>
+            <a:r>
+              <a:rPr/>
+              <a:t>of</a:t>
+            </a:r>
+            <a:r>
+              <a:rPr/>
+              <a:t> </a:t>
+            </a:r>
+            <a:r>
+              <a:rPr/>
+              <a:t>3)</a:t>
+            </a:r>
+          </a:p>
+        </p:txBody>
+      </p:sp>
+      <p:sp>
+        <p:nvSpPr>
+          <p:cNvPr id="3" name="Content Placeholder 2"/>
+          <p:cNvSpPr>
+            <a:spLocks noGrp="1"/>
+          </p:cNvSpPr>
+          <p:nvPr>
+            <p:ph idx="1"/>
+          </p:nvPr>
+        </p:nvSpPr>
+        <p:spPr/>
+        <p:txBody>
+          <a:bodyPr/>
+          <a:lstStyle/>
+          <a:p>
+            <a:pPr lvl="0" marL="1270000" indent="0">
+              <a:buNone/>
+            </a:pPr>
+            <a:r>
+              <a:rPr sz="1800">
+                <a:latin typeface="Courier"/>
+              </a:rPr>
+              <a:t>ods pdf file="../results/import-saratoga.pdf";
+filename raw_data
+  "https://dasl.datadescription.com/download/data/3437";
+libname module01
+  "../data";</a:t>
+            </a:r>
+          </a:p>
+        </p:txBody>
+      </p:sp>
+    </p:spTree>
+  </p:cSld>
+</p:sld>
+</file>
+
+<file path=ppt/slides/slide29.xml><?xml version="1.0" encoding="utf-8"?>
+<p:sld xmlns:a="http://schemas.openxmlformats.org/drawingml/2006/main" xmlns:r="http://schemas.openxmlformats.org/officeDocument/2006/relationships" xmlns:p="http://schemas.openxmlformats.org/presentationml/2006/main">
+  <p:cSld>
+    <p:spTree>
+      <p:nvGrpSpPr>
+        <p:cNvPr id="1" name=""/>
+        <p:cNvGrpSpPr/>
+        <p:nvPr/>
+      </p:nvGrpSpPr>
+      <p:grpSpPr>
+        <a:xfrm>
+          <a:off x="0" y="0"/>
+          <a:ext cx="0" cy="0"/>
+          <a:chOff x="0" y="0"/>
+          <a:chExt cx="0" cy="0"/>
+        </a:xfrm>
+      </p:grpSpPr>
+      <p:sp>
+        <p:nvSpPr>
+          <p:cNvPr id="2" name="Title 1"/>
+          <p:cNvSpPr>
+            <a:spLocks noGrp="1"/>
+          </p:cNvSpPr>
+          <p:nvPr>
+            <p:ph type="title"/>
+          </p:nvPr>
+        </p:nvSpPr>
+        <p:spPr/>
+        <p:txBody>
+          <a:bodyPr/>
+          <a:lstStyle/>
+          <a:p>
+            <a:pPr lvl="0" marL="0" indent="0">
+              <a:buNone/>
+            </a:pPr>
+            <a:r>
+              <a:rPr/>
+              <a:t>import-saratoga.sas</a:t>
+            </a:r>
+            <a:r>
+              <a:rPr/>
+              <a:t> </a:t>
+            </a:r>
+            <a:r>
+              <a:rPr/>
+              <a:t>(2</a:t>
+            </a:r>
+            <a:r>
+              <a:rPr/>
+              <a:t> </a:t>
+            </a:r>
+            <a:r>
+              <a:rPr/>
+              <a:t>of</a:t>
+            </a:r>
+            <a:r>
+              <a:rPr/>
+              <a:t> </a:t>
+            </a:r>
+            <a:r>
+              <a:rPr/>
+              <a:t>3)</a:t>
+            </a:r>
+          </a:p>
+        </p:txBody>
+      </p:sp>
+      <p:sp>
+        <p:nvSpPr>
+          <p:cNvPr id="3" name="Content Placeholder 2"/>
+          <p:cNvSpPr>
+            <a:spLocks noGrp="1"/>
+          </p:cNvSpPr>
+          <p:nvPr>
+            <p:ph idx="1"/>
+          </p:nvPr>
+        </p:nvSpPr>
+        <p:spPr/>
+        <p:txBody>
+          <a:bodyPr/>
+          <a:lstStyle/>
+          <a:p>
+            <a:pPr lvl="0" marL="1270000" indent="0">
+              <a:buNone/>
+            </a:pPr>
+            <a:r>
+              <a:rPr sz="1800">
+                <a:latin typeface="Courier"/>
+              </a:rPr>
+              <a:t>proc import
+    datafile=raw_data dbms=dlm
+    out=module01.saratoga replace;
+  delimiter="09"x;
+  getnames=yes;
+run;</a:t>
             </a:r>
           </a:p>
         </p:txBody>
@@ -16124,6 +19263,108 @@
             <a:r>
               <a:rPr/>
               <a:t>Converting strings to numbers</a:t>
+            </a:r>
+          </a:p>
+        </p:txBody>
+      </p:sp>
+    </p:spTree>
+  </p:cSld>
+</p:sld>
+</file>
+
+<file path=ppt/slides/slide30.xml><?xml version="1.0" encoding="utf-8"?>
+<p:sld xmlns:a="http://schemas.openxmlformats.org/drawingml/2006/main" xmlns:r="http://schemas.openxmlformats.org/officeDocument/2006/relationships" xmlns:p="http://schemas.openxmlformats.org/presentationml/2006/main">
+  <p:cSld>
+    <p:spTree>
+      <p:nvGrpSpPr>
+        <p:cNvPr id="1" name=""/>
+        <p:cNvGrpSpPr/>
+        <p:nvPr/>
+      </p:nvGrpSpPr>
+      <p:grpSpPr>
+        <a:xfrm>
+          <a:off x="0" y="0"/>
+          <a:ext cx="0" cy="0"/>
+          <a:chOff x="0" y="0"/>
+          <a:chExt cx="0" cy="0"/>
+        </a:xfrm>
+      </p:grpSpPr>
+      <p:sp>
+        <p:nvSpPr>
+          <p:cNvPr id="2" name="Title 1"/>
+          <p:cNvSpPr>
+            <a:spLocks noGrp="1"/>
+          </p:cNvSpPr>
+          <p:nvPr>
+            <p:ph type="title"/>
+          </p:nvPr>
+        </p:nvSpPr>
+        <p:spPr/>
+        <p:txBody>
+          <a:bodyPr/>
+          <a:lstStyle/>
+          <a:p>
+            <a:pPr lvl="0" marL="0" indent="0">
+              <a:buNone/>
+            </a:pPr>
+            <a:r>
+              <a:rPr/>
+              <a:t>import-saratoga.sas</a:t>
+            </a:r>
+            <a:r>
+              <a:rPr/>
+              <a:t> </a:t>
+            </a:r>
+            <a:r>
+              <a:rPr/>
+              <a:t>(3</a:t>
+            </a:r>
+            <a:r>
+              <a:rPr/>
+              <a:t> </a:t>
+            </a:r>
+            <a:r>
+              <a:rPr/>
+              <a:t>of</a:t>
+            </a:r>
+            <a:r>
+              <a:rPr/>
+              <a:t> </a:t>
+            </a:r>
+            <a:r>
+              <a:rPr/>
+              <a:t>3)</a:t>
+            </a:r>
+          </a:p>
+        </p:txBody>
+      </p:sp>
+      <p:sp>
+        <p:nvSpPr>
+          <p:cNvPr id="3" name="Content Placeholder 2"/>
+          <p:cNvSpPr>
+            <a:spLocks noGrp="1"/>
+          </p:cNvSpPr>
+          <p:nvPr>
+            <p:ph idx="1"/>
+          </p:nvPr>
+        </p:nvSpPr>
+        <p:spPr/>
+        <p:txBody>
+          <a:bodyPr/>
+          <a:lstStyle/>
+          <a:p>
+            <a:pPr lvl="0" marL="1270000" indent="0">
+              <a:buNone/>
+            </a:pPr>
+            <a:r>
+              <a:rPr sz="1800">
+                <a:latin typeface="Courier"/>
+              </a:rPr>
+              <a:t>proc print
+    data=module01.saratoga(obs=10);
+  title1 "First two rows of data";
+run;
+ods pdf close;</a:t>
             </a:r>
           </a:p>
         </p:txBody>

</xml_diff>

<commit_message>
Experiments with log autosave
</commit_message>
<xml_diff>
--- a/part1/src/importing.pptx
+++ b/part1/src/importing.pptx
@@ -5,7 +5,7 @@
     <p:sldMasterId id="2147483648" r:id="rId1"/>
   </p:sldMasterIdLst>
   <p:notesMasterIdLst>
-    <p:NotesMasterId r:id="rId23"/>
+    <p:NotesMasterId r:id="rId24"/>
   </p:notesMasterIdLst>
   <p:sldIdLst>
     <p:sldId id="256" r:id="rId2"/>
@@ -29,6 +29,7 @@
     <p:sldId id="274" r:id="rId20"/>
     <p:sldId id="275" r:id="rId21"/>
     <p:sldId id="276" r:id="rId22"/>
+    <p:sldId id="277" r:id="rId23"/>
   </p:sldIdLst>
   <p:sldSz cx="9144000" cy="6858000" type="screen4x3"/>
   <p:notesSz cx="6858000" cy="9144000"/>
@@ -751,7 +752,7 @@
           <a:p>
             <a:fld id="{18BDFEC3-8487-43E8-A154-7C12CBC1FFF2}" type="slidenum">
               <a:rPr lang="en-US"/>
-              <a:t>2</a:t>
+              <a:t>3</a:t>
             </a:fld>
             <a:endParaRPr lang="en-US"/>
           </a:p>
@@ -1041,7 +1042,7 @@
           <a:p>
             <a:fld id="{18BDFEC3-8487-43E8-A154-7C12CBC1FFF2}" type="slidenum">
               <a:rPr lang="en-US"/>
-              <a:t>11</a:t>
+              <a:t>12</a:t>
             </a:fld>
             <a:endParaRPr lang="en-US"/>
           </a:p>
@@ -2527,7 +2528,7 @@
           <a:p>
             <a:fld id="{18BDFEC3-8487-43E8-A154-7C12CBC1FFF2}" type="slidenum">
               <a:rPr lang="en-US"/>
-              <a:t>12</a:t>
+              <a:t>13</a:t>
             </a:fld>
             <a:endParaRPr lang="en-US"/>
           </a:p>
@@ -3135,7 +3136,7 @@
           <a:p>
             <a:fld id="{18BDFEC3-8487-43E8-A154-7C12CBC1FFF2}" type="slidenum">
               <a:rPr lang="en-US"/>
-              <a:t>13</a:t>
+              <a:t>14</a:t>
             </a:fld>
             <a:endParaRPr lang="en-US"/>
           </a:p>
@@ -4999,7 +5000,7 @@
           <a:p>
             <a:fld id="{18BDFEC3-8487-43E8-A154-7C12CBC1FFF2}" type="slidenum">
               <a:rPr lang="en-US"/>
-              <a:t>14</a:t>
+              <a:t>15</a:t>
             </a:fld>
             <a:endParaRPr lang="en-US"/>
           </a:p>
@@ -5225,7 +5226,7 @@
           <a:p>
             <a:fld id="{18BDFEC3-8487-43E8-A154-7C12CBC1FFF2}" type="slidenum">
               <a:rPr lang="en-US"/>
-              <a:t>15</a:t>
+              <a:t>16</a:t>
             </a:fld>
             <a:endParaRPr lang="en-US"/>
           </a:p>
@@ -5657,7 +5658,7 @@
           <a:p>
             <a:fld id="{18BDFEC3-8487-43E8-A154-7C12CBC1FFF2}" type="slidenum">
               <a:rPr lang="en-US"/>
-              <a:t>16</a:t>
+              <a:t>17</a:t>
             </a:fld>
             <a:endParaRPr lang="en-US"/>
           </a:p>
@@ -5923,7 +5924,7 @@
           <a:p>
             <a:fld id="{18BDFEC3-8487-43E8-A154-7C12CBC1FFF2}" type="slidenum">
               <a:rPr lang="en-US"/>
-              <a:t>17</a:t>
+              <a:t>18</a:t>
             </a:fld>
             <a:endParaRPr lang="en-US"/>
           </a:p>
@@ -7463,7 +7464,7 @@
           <a:p>
             <a:fld id="{18BDFEC3-8487-43E8-A154-7C12CBC1FFF2}" type="slidenum">
               <a:rPr lang="en-US"/>
-              <a:t>18</a:t>
+              <a:t>19</a:t>
             </a:fld>
             <a:endParaRPr lang="en-US"/>
           </a:p>
@@ -7625,7 +7626,7 @@
           <a:p>
             <a:fld id="{18BDFEC3-8487-43E8-A154-7C12CBC1FFF2}" type="slidenum">
               <a:rPr lang="en-US"/>
-              <a:t>20</a:t>
+              <a:t>21</a:t>
             </a:fld>
             <a:endParaRPr lang="en-US"/>
           </a:p>
@@ -8455,7 +8456,7 @@
           <a:p>
             <a:fld id="{18BDFEC3-8487-43E8-A154-7C12CBC1FFF2}" type="slidenum">
               <a:rPr lang="en-US"/>
-              <a:t>3</a:t>
+              <a:t>4</a:t>
             </a:fld>
             <a:endParaRPr lang="en-US"/>
           </a:p>
@@ -8689,7 +8690,7 @@
           <a:p>
             <a:fld id="{18BDFEC3-8487-43E8-A154-7C12CBC1FFF2}" type="slidenum">
               <a:rPr lang="en-US"/>
-              <a:t>4</a:t>
+              <a:t>5</a:t>
             </a:fld>
             <a:endParaRPr lang="en-US"/>
           </a:p>
@@ -8851,7 +8852,7 @@
           <a:p>
             <a:fld id="{18BDFEC3-8487-43E8-A154-7C12CBC1FFF2}" type="slidenum">
               <a:rPr lang="en-US"/>
-              <a:t>5</a:t>
+              <a:t>6</a:t>
             </a:fld>
             <a:endParaRPr lang="en-US"/>
           </a:p>
@@ -9499,7 +9500,7 @@
           <a:p>
             <a:fld id="{18BDFEC3-8487-43E8-A154-7C12CBC1FFF2}" type="slidenum">
               <a:rPr lang="en-US"/>
-              <a:t>6</a:t>
+              <a:t>7</a:t>
             </a:fld>
             <a:endParaRPr lang="en-US"/>
           </a:p>
@@ -9837,7 +9838,7 @@
           <a:p>
             <a:fld id="{18BDFEC3-8487-43E8-A154-7C12CBC1FFF2}" type="slidenum">
               <a:rPr lang="en-US"/>
-              <a:t>7</a:t>
+              <a:t>8</a:t>
             </a:fld>
             <a:endParaRPr lang="en-US"/>
           </a:p>
@@ -10333,7 +10334,7 @@
           <a:p>
             <a:fld id="{18BDFEC3-8487-43E8-A154-7C12CBC1FFF2}" type="slidenum">
               <a:rPr lang="en-US"/>
-              <a:t>8</a:t>
+              <a:t>9</a:t>
             </a:fld>
             <a:endParaRPr lang="en-US"/>
           </a:p>
@@ -10639,7 +10640,7 @@
           <a:p>
             <a:fld id="{18BDFEC3-8487-43E8-A154-7C12CBC1FFF2}" type="slidenum">
               <a:rPr lang="en-US"/>
-              <a:t>9</a:t>
+              <a:t>10</a:t>
             </a:fld>
             <a:endParaRPr lang="en-US"/>
           </a:p>
@@ -11367,7 +11368,7 @@
           <a:p>
             <a:fld id="{18BDFEC3-8487-43E8-A154-7C12CBC1FFF2}" type="slidenum">
               <a:rPr lang="en-US"/>
-              <a:t>10</a:t>
+              <a:t>11</a:t>
             </a:fld>
             <a:endParaRPr lang="en-US"/>
           </a:p>
@@ -14551,7 +14552,7 @@
             </a:pPr>
             <a:r>
               <a:rPr/>
-              <a:t>Tilde</a:t>
+              <a:t>Comma</a:t>
             </a:r>
             <a:r>
               <a:rPr/>
@@ -14567,7 +14568,15 @@
             </a:r>
             <a:r>
               <a:rPr/>
-              <a:t>example</a:t>
+              <a:t>SAS</a:t>
+            </a:r>
+            <a:r>
+              <a:rPr/>
+              <a:t> </a:t>
+            </a:r>
+            <a:r>
+              <a:rPr/>
+              <a:t>code</a:t>
             </a:r>
           </a:p>
         </p:txBody>
@@ -14594,11 +14603,18 @@
               <a:rPr sz="1800">
                 <a:latin typeface="Courier"/>
               </a:rPr>
-              <a:t>4~8~40
-8~16~80
-12~24~120
-16~32~160
-24~48~240</a:t>
+              <a:t>filename raw_data
+  "../data/comma-delimited.csv";
+libname module01
+  "../data";
+data module01.comma_delimited;
+  infile raw_data delimiter=",";
+  input x y z;
+run;
+proc print
+    data=module01.comma_delimited(obs=2);
+  title1 "First two rows of data";
+run;</a:t>
             </a:r>
           </a:p>
         </p:txBody>
@@ -14661,15 +14677,7 @@
             </a:r>
             <a:r>
               <a:rPr/>
-              <a:t>SAS</a:t>
-            </a:r>
-            <a:r>
-              <a:rPr/>
-              <a:t> </a:t>
-            </a:r>
-            <a:r>
-              <a:rPr/>
-              <a:t>code</a:t>
+              <a:t>example</a:t>
             </a:r>
           </a:p>
         </p:txBody>
@@ -14696,18 +14704,11 @@
               <a:rPr sz="1800">
                 <a:latin typeface="Courier"/>
               </a:rPr>
-              <a:t>filename raw_data
-  "../data/tilde-delimited.txt";
-libname module01
-  "../data";
-data module01.tilde_delimited;
-  infile raw_data delimiter="~";
-  input x y z;
-run;
-proc print
-    data=module01.tilde_delimited(obs=2);
-  title1 "First two rows of data";
-run;</a:t>
+              <a:t>4~8~40
+8~16~80
+12~24~120
+16~32~160
+24~48~240</a:t>
             </a:r>
           </a:p>
         </p:txBody>
@@ -14754,7 +14755,7 @@
             </a:pPr>
             <a:r>
               <a:rPr/>
-              <a:t>Tab</a:t>
+              <a:t>Tilde</a:t>
             </a:r>
             <a:r>
               <a:rPr/>
@@ -14770,7 +14771,15 @@
             </a:r>
             <a:r>
               <a:rPr/>
-              <a:t>example</a:t>
+              <a:t>SAS</a:t>
+            </a:r>
+            <a:r>
+              <a:rPr/>
+              <a:t> </a:t>
+            </a:r>
+            <a:r>
+              <a:rPr/>
+              <a:t>code</a:t>
             </a:r>
           </a:p>
         </p:txBody>
@@ -14797,11 +14806,18 @@
               <a:rPr sz="1800">
                 <a:latin typeface="Courier"/>
               </a:rPr>
-              <a:t>4   8   40
-8   16  80
-12  24  120
-16  32  160
-24  48  240</a:t>
+              <a:t>filename raw_data
+  "../data/tilde-delimited.txt";
+libname module01
+  "../data";
+data module01.tilde_delimited;
+  infile raw_data delimiter="~";
+  input x y z;
+run;
+proc print
+    data=module01.tilde_delimited(obs=2);
+  title1 "First two rows of data";
+run;</a:t>
             </a:r>
           </a:p>
         </p:txBody>
@@ -14864,15 +14880,7 @@
             </a:r>
             <a:r>
               <a:rPr/>
-              <a:t>SAS</a:t>
-            </a:r>
-            <a:r>
-              <a:rPr/>
-              <a:t> </a:t>
-            </a:r>
-            <a:r>
-              <a:rPr/>
-              <a:t>code</a:t>
+              <a:t>example</a:t>
             </a:r>
           </a:p>
         </p:txBody>
@@ -14899,18 +14907,11 @@
               <a:rPr sz="1800">
                 <a:latin typeface="Courier"/>
               </a:rPr>
-              <a:t>filename raw_data
-  "../data/tab-delimited.txt";
-libname module01
-  "../data";
-data module01.tab_delimited;
-  infile raw_data delimiter="09"X;
-  input x y z;
-run;
-proc print
-    data=module01.tab_delimited(obs=2);
-  title1 "First two rows of data";
-run;</a:t>
+              <a:t>4   8   40
+8   16  80
+12  24  120
+16  32  160
+24  48  240</a:t>
             </a:r>
           </a:p>
         </p:txBody>
@@ -14957,23 +14958,31 @@
             </a:pPr>
             <a:r>
               <a:rPr/>
-              <a:t>Fixed</a:t>
-            </a:r>
-            <a:r>
-              <a:rPr/>
-              <a:t> </a:t>
-            </a:r>
-            <a:r>
-              <a:rPr/>
-              <a:t>width,</a:t>
-            </a:r>
-            <a:r>
-              <a:rPr/>
-              <a:t> </a:t>
-            </a:r>
-            <a:r>
-              <a:rPr/>
-              <a:t>example</a:t>
+              <a:t>Tab</a:t>
+            </a:r>
+            <a:r>
+              <a:rPr/>
+              <a:t> </a:t>
+            </a:r>
+            <a:r>
+              <a:rPr/>
+              <a:t>delimited,</a:t>
+            </a:r>
+            <a:r>
+              <a:rPr/>
+              <a:t> </a:t>
+            </a:r>
+            <a:r>
+              <a:rPr/>
+              <a:t>SAS</a:t>
+            </a:r>
+            <a:r>
+              <a:rPr/>
+              <a:t> </a:t>
+            </a:r>
+            <a:r>
+              <a:rPr/>
+              <a:t>code</a:t>
             </a:r>
           </a:p>
         </p:txBody>
@@ -15000,11 +15009,18 @@
               <a:rPr sz="1800">
                 <a:latin typeface="Courier"/>
               </a:rPr>
-              <a:t> 4 8 40
- 816 80
-1224120
-1632160
-2448240</a:t>
+              <a:t>filename raw_data
+  "../data/tab-delimited.txt";
+libname module01
+  "../data";
+data module01.tab_delimited;
+  infile raw_data delimiter="09"X;
+  input x y z;
+run;
+proc print
+    data=module01.tab_delimited(obs=2);
+  title1 "First two rows of data";
+run;</a:t>
             </a:r>
           </a:p>
         </p:txBody>
@@ -15067,15 +15083,7 @@
             </a:r>
             <a:r>
               <a:rPr/>
-              <a:t>SAS</a:t>
-            </a:r>
-            <a:r>
-              <a:rPr/>
-              <a:t> </a:t>
-            </a:r>
-            <a:r>
-              <a:rPr/>
-              <a:t>code</a:t>
+              <a:t>example</a:t>
             </a:r>
           </a:p>
         </p:txBody>
@@ -15102,21 +15110,11 @@
               <a:rPr sz="1800">
                 <a:latin typeface="Courier"/>
               </a:rPr>
-              <a:t>filename raw_data
-  "../data/fixed-width.txt";
-libname module01
-  "../data";
-data module01.fixed_width;
-  infile raw_data delimiter=",";
-  input 
-    x 1-2
-    y 3-4
-    z 5-7;
-run;
-proc print
-    data=module01.fixed_width(obs=2);
-  title1 "First two rows of data";
-run;</a:t>
+              <a:t> 4 8 40
+ 816 80
+1224120
+1632160
+2448240</a:t>
             </a:r>
           </a:p>
         </p:txBody>
@@ -15163,23 +15161,31 @@
             </a:pPr>
             <a:r>
               <a:rPr/>
-              <a:t>String</a:t>
-            </a:r>
-            <a:r>
-              <a:rPr/>
-              <a:t> </a:t>
-            </a:r>
-            <a:r>
-              <a:rPr/>
-              <a:t>data,</a:t>
-            </a:r>
-            <a:r>
-              <a:rPr/>
-              <a:t> </a:t>
-            </a:r>
-            <a:r>
-              <a:rPr/>
-              <a:t>example</a:t>
+              <a:t>Fixed</a:t>
+            </a:r>
+            <a:r>
+              <a:rPr/>
+              <a:t> </a:t>
+            </a:r>
+            <a:r>
+              <a:rPr/>
+              <a:t>width,</a:t>
+            </a:r>
+            <a:r>
+              <a:rPr/>
+              <a:t> </a:t>
+            </a:r>
+            <a:r>
+              <a:rPr/>
+              <a:t>SAS</a:t>
+            </a:r>
+            <a:r>
+              <a:rPr/>
+              <a:t> </a:t>
+            </a:r>
+            <a:r>
+              <a:rPr/>
+              <a:t>code</a:t>
             </a:r>
           </a:p>
         </p:txBody>
@@ -15206,11 +15212,21 @@
               <a:rPr sz="1800">
                 <a:latin typeface="Courier"/>
               </a:rPr>
-              <a:t>Alpha 4 8
-Bravo 8 16
-Charlie 12 24
-Delta 16 32
-Echo 24 48</a:t>
+              <a:t>filename raw_data
+  "../data/fixed-width.txt";
+libname module01
+  "../data";
+data module01.fixed_width;
+  infile raw_data delimiter=",";
+  input 
+    x 1-2
+    y 3-4
+    z 5-7;
+run;
+proc print
+    data=module01.fixed_width(obs=2);
+  title1 "First two rows of data";
+run;</a:t>
             </a:r>
           </a:p>
         </p:txBody>
@@ -15273,15 +15289,7 @@
             </a:r>
             <a:r>
               <a:rPr/>
-              <a:t>SAS</a:t>
-            </a:r>
-            <a:r>
-              <a:rPr/>
-              <a:t> </a:t>
-            </a:r>
-            <a:r>
-              <a:rPr/>
-              <a:t>code</a:t>
+              <a:t>example</a:t>
             </a:r>
           </a:p>
         </p:txBody>
@@ -15308,21 +15316,11 @@
               <a:rPr sz="1800">
                 <a:latin typeface="Courier"/>
               </a:rPr>
-              <a:t>filename raw_data
-  "../data/string-data.txt";
-libname module01
-  "../data";
-data module01.string_data;
-  infile raw_data delimiter=" ";
-  input 
-    name $
-    x
-    y;
-run;
-proc print
-    data=module01.string_data(obs=2);
-  title1 "First two rows of data";
-run;</a:t>
+              <a:t>Alpha 4 8
+Bravo 8 16
+Charlie 12 24
+Delta 16 32
+Echo 24 48</a:t>
             </a:r>
           </a:p>
         </p:txBody>
@@ -15369,31 +15367,31 @@
             </a:pPr>
             <a:r>
               <a:rPr/>
-              <a:t>Complications</a:t>
-            </a:r>
-            <a:r>
-              <a:rPr/>
-              <a:t> </a:t>
-            </a:r>
-            <a:r>
-              <a:rPr/>
-              <a:t>with</a:t>
-            </a:r>
-            <a:r>
-              <a:rPr/>
-              <a:t> </a:t>
-            </a:r>
-            <a:r>
-              <a:rPr/>
-              <a:t>string</a:t>
-            </a:r>
-            <a:r>
-              <a:rPr/>
-              <a:t> </a:t>
-            </a:r>
-            <a:r>
-              <a:rPr/>
-              <a:t>data</a:t>
+              <a:t>String</a:t>
+            </a:r>
+            <a:r>
+              <a:rPr/>
+              <a:t> </a:t>
+            </a:r>
+            <a:r>
+              <a:rPr/>
+              <a:t>data,</a:t>
+            </a:r>
+            <a:r>
+              <a:rPr/>
+              <a:t> </a:t>
+            </a:r>
+            <a:r>
+              <a:rPr/>
+              <a:t>SAS</a:t>
+            </a:r>
+            <a:r>
+              <a:rPr/>
+              <a:t> </a:t>
+            </a:r>
+            <a:r>
+              <a:rPr/>
+              <a:t>code</a:t>
             </a:r>
           </a:p>
         </p:txBody>
@@ -15413,80 +15411,28 @@
           <a:bodyPr/>
           <a:lstStyle/>
           <a:p>
-            <a:pPr lvl="1"/>
-            <a:r>
-              <a:rPr/>
-              <a:t>Strings longer than eight characters</a:t>
-            </a:r>
-          </a:p>
-          <a:p>
-            <a:pPr lvl="2"/>
-            <a:r>
-              <a:rPr/>
-              <a:t>Informat statement</a:t>
-            </a:r>
-          </a:p>
-          <a:p>
-            <a:pPr lvl="1"/>
-            <a:r>
-              <a:rPr/>
-              <a:t>Strings with delimiters</a:t>
-            </a:r>
-          </a:p>
-          <a:p>
-            <a:pPr lvl="2"/>
-            <a:r>
-              <a:rPr/>
-              <a:t>Use different delimiter</a:t>
-            </a:r>
-          </a:p>
-          <a:p>
-            <a:pPr lvl="2"/>
-            <a:r>
-              <a:rPr/>
-              <a:t>Enclose sting in quotes</a:t>
-            </a:r>
-          </a:p>
-          <a:p>
-            <a:pPr lvl="1"/>
-            <a:r>
-              <a:rPr/>
-              <a:t>Strings with quotes</a:t>
-            </a:r>
-          </a:p>
-          <a:p>
-            <a:pPr lvl="2"/>
-            <a:r>
-              <a:rPr/>
-              <a:t>Use double quotes around string with single quote</a:t>
-            </a:r>
-          </a:p>
-          <a:p>
-            <a:pPr lvl="3"/>
-            <a:r>
-              <a:rPr/>
-              <a:t>“It’s my bidthday!”</a:t>
-            </a:r>
-          </a:p>
-          <a:p>
-            <a:pPr lvl="2"/>
-            <a:r>
-              <a:rPr/>
-              <a:t>Use single quotes around string with double quote</a:t>
-            </a:r>
-          </a:p>
-          <a:p>
-            <a:pPr lvl="3"/>
-            <a:r>
-              <a:rPr/>
-              <a:t>‘Smile and say “Cheese!” when I take this picture’</a:t>
-            </a:r>
-          </a:p>
-          <a:p>
-            <a:pPr lvl="2"/>
-            <a:r>
-              <a:rPr/>
-              <a:t>Use escape codes</a:t>
+            <a:pPr lvl="0" marL="1270000" indent="0">
+              <a:buNone/>
+            </a:pPr>
+            <a:r>
+              <a:rPr sz="1800">
+                <a:latin typeface="Courier"/>
+              </a:rPr>
+              <a:t>filename raw_data
+  "../data/string-data.txt";
+libname module01
+  "../data";
+data module01.string_data;
+  infile raw_data delimiter=" ";
+  input 
+    name $
+    x
+    y;
+run;
+proc print
+    data=module01.string_data(obs=2);
+  title1 "First two rows of data";
+run;</a:t>
             </a:r>
           </a:p>
         </p:txBody>
@@ -15533,31 +15479,31 @@
             </a:pPr>
             <a:r>
               <a:rPr/>
-              <a:t>First</a:t>
-            </a:r>
-            <a:r>
-              <a:rPr/>
-              <a:t> </a:t>
-            </a:r>
-            <a:r>
-              <a:rPr/>
-              <a:t>line</a:t>
-            </a:r>
-            <a:r>
-              <a:rPr/>
-              <a:t> </a:t>
-            </a:r>
-            <a:r>
-              <a:rPr/>
-              <a:t>names,</a:t>
-            </a:r>
-            <a:r>
-              <a:rPr/>
-              <a:t> </a:t>
-            </a:r>
-            <a:r>
-              <a:rPr/>
-              <a:t>example</a:t>
+              <a:t>Complications</a:t>
+            </a:r>
+            <a:r>
+              <a:rPr/>
+              <a:t> </a:t>
+            </a:r>
+            <a:r>
+              <a:rPr/>
+              <a:t>with</a:t>
+            </a:r>
+            <a:r>
+              <a:rPr/>
+              <a:t> </a:t>
+            </a:r>
+            <a:r>
+              <a:rPr/>
+              <a:t>string</a:t>
+            </a:r>
+            <a:r>
+              <a:rPr/>
+              <a:t> </a:t>
+            </a:r>
+            <a:r>
+              <a:rPr/>
+              <a:t>data</a:t>
             </a:r>
           </a:p>
         </p:txBody>
@@ -15577,19 +15523,80 @@
           <a:bodyPr/>
           <a:lstStyle/>
           <a:p>
-            <a:pPr lvl="0" marL="1270000" indent="0">
-              <a:buNone/>
-            </a:pPr>
-            <a:r>
-              <a:rPr sz="1800">
-                <a:latin typeface="Courier"/>
-              </a:rPr>
-              <a:t>name x y
-Alpha 4 8
-Bravo 8 16
-Charlie 12 24
-Delta 16 32
-Echo 24 48</a:t>
+            <a:pPr lvl="1"/>
+            <a:r>
+              <a:rPr/>
+              <a:t>Strings longer than eight characters</a:t>
+            </a:r>
+          </a:p>
+          <a:p>
+            <a:pPr lvl="2"/>
+            <a:r>
+              <a:rPr/>
+              <a:t>Informat statement</a:t>
+            </a:r>
+          </a:p>
+          <a:p>
+            <a:pPr lvl="1"/>
+            <a:r>
+              <a:rPr/>
+              <a:t>Strings with delimiters</a:t>
+            </a:r>
+          </a:p>
+          <a:p>
+            <a:pPr lvl="2"/>
+            <a:r>
+              <a:rPr/>
+              <a:t>Use different delimiter</a:t>
+            </a:r>
+          </a:p>
+          <a:p>
+            <a:pPr lvl="2"/>
+            <a:r>
+              <a:rPr/>
+              <a:t>Enclose sting in quotes</a:t>
+            </a:r>
+          </a:p>
+          <a:p>
+            <a:pPr lvl="1"/>
+            <a:r>
+              <a:rPr/>
+              <a:t>Strings with quotes</a:t>
+            </a:r>
+          </a:p>
+          <a:p>
+            <a:pPr lvl="2"/>
+            <a:r>
+              <a:rPr/>
+              <a:t>Use double quotes around string with single quote</a:t>
+            </a:r>
+          </a:p>
+          <a:p>
+            <a:pPr lvl="3"/>
+            <a:r>
+              <a:rPr/>
+              <a:t>“It’s my bidthday!”</a:t>
+            </a:r>
+          </a:p>
+          <a:p>
+            <a:pPr lvl="2"/>
+            <a:r>
+              <a:rPr/>
+              <a:t>Use single quotes around string with double quote</a:t>
+            </a:r>
+          </a:p>
+          <a:p>
+            <a:pPr lvl="3"/>
+            <a:r>
+              <a:rPr/>
+              <a:t>‘Smile and say “Cheese!” when I take this picture’</a:t>
+            </a:r>
+          </a:p>
+          <a:p>
+            <a:pPr lvl="2"/>
+            <a:r>
+              <a:rPr/>
+              <a:t>Use escape codes</a:t>
             </a:r>
           </a:p>
         </p:txBody>
@@ -15636,101 +15643,41 @@
             </a:pPr>
             <a:r>
               <a:rPr/>
-              <a:t>Importing</a:t>
-            </a:r>
-            <a:r>
-              <a:rPr/>
-              <a:t> </a:t>
-            </a:r>
-            <a:r>
-              <a:rPr/>
-              <a:t>choices</a:t>
-            </a:r>
-            <a:r>
-              <a:rPr/>
-              <a:t> </a:t>
-            </a:r>
-            <a:r>
-              <a:rPr/>
-              <a:t>(1</a:t>
-            </a:r>
-            <a:r>
-              <a:rPr/>
-              <a:t> </a:t>
-            </a:r>
-            <a:r>
-              <a:rPr/>
-              <a:t>of</a:t>
-            </a:r>
-            <a:r>
-              <a:rPr/>
-              <a:t> </a:t>
-            </a:r>
-            <a:r>
-              <a:rPr/>
-              <a:t>2)</a:t>
+              <a:t>Test</a:t>
             </a:r>
           </a:p>
         </p:txBody>
       </p:sp>
-      <p:sp>
-        <p:nvSpPr>
-          <p:cNvPr id="3" name="Content Placeholder 2"/>
-          <p:cNvSpPr>
-            <a:spLocks noGrp="1"/>
-          </p:cNvSpPr>
-          <p:nvPr>
-            <p:ph idx="1"/>
-          </p:nvPr>
-        </p:nvSpPr>
-        <p:spPr/>
-        <p:txBody>
-          <a:bodyPr/>
-          <a:lstStyle/>
-          <a:p>
-            <a:pPr lvl="1"/>
-            <a:r>
-              <a:rPr/>
-              <a:t>A wide range of formats</a:t>
-            </a:r>
-          </a:p>
-          <a:p>
-            <a:pPr lvl="2"/>
-            <a:r>
-              <a:rPr/>
-              <a:t>Space delimited</a:t>
-            </a:r>
-          </a:p>
-          <a:p>
-            <a:pPr lvl="2"/>
-            <a:r>
-              <a:rPr/>
-              <a:t>Comma separated values</a:t>
-            </a:r>
-          </a:p>
-          <a:p>
-            <a:pPr lvl="2"/>
-            <a:r>
-              <a:rPr/>
-              <a:t>Tab delimited</a:t>
-            </a:r>
-          </a:p>
-          <a:p>
-            <a:pPr lvl="2"/>
-            <a:r>
-              <a:rPr/>
-              <a:t>Fixed format</a:t>
-            </a:r>
-          </a:p>
-          <a:p>
-            <a:pPr lvl="1"/>
-            <a:r>
-              <a:rPr/>
-              <a:t>Strings in your input</a:t>
-            </a:r>
-          </a:p>
-        </p:txBody>
-      </p:sp>
+      <p:pic>
+        <p:nvPicPr>
+          <p:cNvPr descr="../images/test-tilde.png" id="0" name="Picture 1"/>
+          <p:cNvPicPr>
+            <a:picLocks noGrp="1" noChangeAspect="1"/>
+          </p:cNvPicPr>
+          <p:nvPr/>
+        </p:nvPicPr>
+        <p:blipFill>
+          <a:blip r:embed="rId2"/>
+          <a:stretch>
+            <a:fillRect/>
+          </a:stretch>
+        </p:blipFill>
+        <p:spPr bwMode="auto">
+          <a:xfrm>
+            <a:off x="457200" y="1816100"/>
+            <a:ext cx="8229600" cy="4089400"/>
+          </a:xfrm>
+          <a:prstGeom prst="rect">
+            <a:avLst/>
+          </a:prstGeom>
+          <a:noFill/>
+          <a:ln w="9525">
+            <a:noFill/>
+            <a:headEnd/>
+            <a:tailEnd/>
+          </a:ln>
+        </p:spPr>
+      </p:pic>
     </p:spTree>
   </p:cSld>
 </p:sld>
@@ -15797,15 +15744,7 @@
             </a:r>
             <a:r>
               <a:rPr/>
-              <a:t>SAS</a:t>
-            </a:r>
-            <a:r>
-              <a:rPr/>
-              <a:t> </a:t>
-            </a:r>
-            <a:r>
-              <a:rPr/>
-              <a:t>code</a:t>
+              <a:t>example</a:t>
             </a:r>
           </a:p>
         </p:txBody>
@@ -15832,20 +15771,12 @@
               <a:rPr sz="1800">
                 <a:latin typeface="Courier"/>
               </a:rPr>
-              <a:t>filename raw_data
-  "../data/first-line-names.txt";
-libname module01
-  "../data";
-proc import
-    datafile=raw_data dbms=dlm
-    out=module01.first_line_names replace;
-  delimiter=" ";
-  getnames=yes;
-run;
-proc print
-    data=module01.first_line_names(obs=2);
-  title1 "First two rows of data";
-run;</a:t>
+              <a:t>name x y
+Alpha 4 8
+Bravo 8 16
+Charlie 12 24
+Delta 16 32
+Echo 24 48</a:t>
             </a:r>
           </a:p>
         </p:txBody>
@@ -15892,6 +15823,125 @@
             </a:pPr>
             <a:r>
               <a:rPr/>
+              <a:t>First</a:t>
+            </a:r>
+            <a:r>
+              <a:rPr/>
+              <a:t> </a:t>
+            </a:r>
+            <a:r>
+              <a:rPr/>
+              <a:t>line</a:t>
+            </a:r>
+            <a:r>
+              <a:rPr/>
+              <a:t> </a:t>
+            </a:r>
+            <a:r>
+              <a:rPr/>
+              <a:t>names,</a:t>
+            </a:r>
+            <a:r>
+              <a:rPr/>
+              <a:t> </a:t>
+            </a:r>
+            <a:r>
+              <a:rPr/>
+              <a:t>SAS</a:t>
+            </a:r>
+            <a:r>
+              <a:rPr/>
+              <a:t> </a:t>
+            </a:r>
+            <a:r>
+              <a:rPr/>
+              <a:t>code</a:t>
+            </a:r>
+          </a:p>
+        </p:txBody>
+      </p:sp>
+      <p:sp>
+        <p:nvSpPr>
+          <p:cNvPr id="3" name="Content Placeholder 2"/>
+          <p:cNvSpPr>
+            <a:spLocks noGrp="1"/>
+          </p:cNvSpPr>
+          <p:nvPr>
+            <p:ph idx="1"/>
+          </p:nvPr>
+        </p:nvSpPr>
+        <p:spPr/>
+        <p:txBody>
+          <a:bodyPr/>
+          <a:lstStyle/>
+          <a:p>
+            <a:pPr lvl="0" marL="1270000" indent="0">
+              <a:buNone/>
+            </a:pPr>
+            <a:r>
+              <a:rPr sz="1800">
+                <a:latin typeface="Courier"/>
+              </a:rPr>
+              <a:t>filename raw_data
+  "../data/first-line-names.txt";
+libname module01
+  "../data";
+proc import
+    datafile=raw_data dbms=dlm
+    out=module01.first_line_names replace;
+  delimiter=" ";
+  getnames=yes;
+run;
+proc print
+    data=module01.first_line_names(obs=2);
+  title1 "First two rows of data";
+run;</a:t>
+            </a:r>
+          </a:p>
+        </p:txBody>
+      </p:sp>
+    </p:spTree>
+  </p:cSld>
+</p:sld>
+</file>
+
+<file path=ppt/slides/slide22.xml><?xml version="1.0" encoding="utf-8"?>
+<p:sld xmlns:a="http://schemas.openxmlformats.org/drawingml/2006/main" xmlns:r="http://schemas.openxmlformats.org/officeDocument/2006/relationships" xmlns:p="http://schemas.openxmlformats.org/presentationml/2006/main">
+  <p:cSld>
+    <p:spTree>
+      <p:nvGrpSpPr>
+        <p:cNvPr id="1" name=""/>
+        <p:cNvGrpSpPr/>
+        <p:nvPr/>
+      </p:nvGrpSpPr>
+      <p:grpSpPr>
+        <a:xfrm>
+          <a:off x="0" y="0"/>
+          <a:ext cx="0" cy="0"/>
+          <a:chOff x="0" y="0"/>
+          <a:chExt cx="0" cy="0"/>
+        </a:xfrm>
+      </p:grpSpPr>
+      <p:sp>
+        <p:nvSpPr>
+          <p:cNvPr id="2" name="Title 1"/>
+          <p:cNvSpPr>
+            <a:spLocks noGrp="1"/>
+          </p:cNvSpPr>
+          <p:nvPr>
+            <p:ph type="title"/>
+          </p:nvPr>
+        </p:nvSpPr>
+        <p:spPr/>
+        <p:txBody>
+          <a:bodyPr/>
+          <a:lstStyle/>
+          <a:p>
+            <a:pPr lvl="0" marL="0" indent="0">
+              <a:buNone/>
+            </a:pPr>
+            <a:r>
+              <a:rPr/>
               <a:t>Read</a:t>
             </a:r>
             <a:r>
@@ -16035,7 +16085,7 @@
             </a:r>
             <a:r>
               <a:rPr/>
-              <a:t>(2</a:t>
+              <a:t>(1</a:t>
             </a:r>
             <a:r>
               <a:rPr/>
@@ -16074,56 +16124,42 @@
             <a:pPr lvl="1"/>
             <a:r>
               <a:rPr/>
-              <a:t>proc import</a:t>
+              <a:t>A wide range of formats</a:t>
             </a:r>
           </a:p>
           <a:p>
             <a:pPr lvl="2"/>
             <a:r>
               <a:rPr/>
-              <a:t>First row includes variable names</a:t>
+              <a:t>Space delimited</a:t>
             </a:r>
           </a:p>
           <a:p>
             <a:pPr lvl="2"/>
             <a:r>
               <a:rPr/>
-              <a:t>Binary data files</a:t>
+              <a:t>Comma separated values</a:t>
+            </a:r>
+          </a:p>
+          <a:p>
+            <a:pPr lvl="2"/>
+            <a:r>
+              <a:rPr/>
+              <a:t>Tab delimited</a:t>
+            </a:r>
+          </a:p>
+          <a:p>
+            <a:pPr lvl="2"/>
+            <a:r>
+              <a:rPr/>
+              <a:t>Fixed format</a:t>
             </a:r>
           </a:p>
           <a:p>
             <a:pPr lvl="1"/>
             <a:r>
               <a:rPr/>
-              <a:t>Manual reformatting</a:t>
-            </a:r>
-          </a:p>
-          <a:p>
-            <a:pPr lvl="2"/>
-            <a:r>
-              <a:rPr/>
-              <a:t>Global search and replace</a:t>
-            </a:r>
-          </a:p>
-          <a:p>
-            <a:pPr lvl="2"/>
-            <a:r>
-              <a:rPr/>
-              <a:t>Not usually a good idea</a:t>
-            </a:r>
-          </a:p>
-          <a:p>
-            <a:pPr lvl="1"/>
-            <a:r>
-              <a:rPr/>
-              <a:t>Skipping rows</a:t>
-            </a:r>
-          </a:p>
-          <a:p>
-            <a:pPr lvl="1"/>
-            <a:r>
-              <a:rPr/>
-              <a:t>Converting strings to numbers</a:t>
+              <a:t>Strings in your input</a:t>
             </a:r>
           </a:p>
         </p:txBody>
@@ -16170,23 +16206,39 @@
             </a:pPr>
             <a:r>
               <a:rPr/>
-              <a:t>Space</a:t>
-            </a:r>
-            <a:r>
-              <a:rPr/>
-              <a:t> </a:t>
-            </a:r>
-            <a:r>
-              <a:rPr/>
-              <a:t>delimited,</a:t>
-            </a:r>
-            <a:r>
-              <a:rPr/>
-              <a:t> </a:t>
-            </a:r>
-            <a:r>
-              <a:rPr/>
-              <a:t>example</a:t>
+              <a:t>Importing</a:t>
+            </a:r>
+            <a:r>
+              <a:rPr/>
+              <a:t> </a:t>
+            </a:r>
+            <a:r>
+              <a:rPr/>
+              <a:t>choices</a:t>
+            </a:r>
+            <a:r>
+              <a:rPr/>
+              <a:t> </a:t>
+            </a:r>
+            <a:r>
+              <a:rPr/>
+              <a:t>(2</a:t>
+            </a:r>
+            <a:r>
+              <a:rPr/>
+              <a:t> </a:t>
+            </a:r>
+            <a:r>
+              <a:rPr/>
+              <a:t>of</a:t>
+            </a:r>
+            <a:r>
+              <a:rPr/>
+              <a:t> </a:t>
+            </a:r>
+            <a:r>
+              <a:rPr/>
+              <a:t>2)</a:t>
             </a:r>
           </a:p>
         </p:txBody>
@@ -16206,18 +16258,59 @@
           <a:bodyPr/>
           <a:lstStyle/>
           <a:p>
-            <a:pPr lvl="0" marL="1270000" indent="0">
-              <a:buNone/>
-            </a:pPr>
-            <a:r>
-              <a:rPr sz="1800">
-                <a:latin typeface="Courier"/>
-              </a:rPr>
-              <a:t>4 8 40
-8 16 80
-12 24 120
-16 32 160
-24 48 240</a:t>
+            <a:pPr lvl="1"/>
+            <a:r>
+              <a:rPr/>
+              <a:t>proc import</a:t>
+            </a:r>
+          </a:p>
+          <a:p>
+            <a:pPr lvl="2"/>
+            <a:r>
+              <a:rPr/>
+              <a:t>First row includes variable names</a:t>
+            </a:r>
+          </a:p>
+          <a:p>
+            <a:pPr lvl="2"/>
+            <a:r>
+              <a:rPr/>
+              <a:t>Binary data files</a:t>
+            </a:r>
+          </a:p>
+          <a:p>
+            <a:pPr lvl="1"/>
+            <a:r>
+              <a:rPr/>
+              <a:t>Manual reformatting</a:t>
+            </a:r>
+          </a:p>
+          <a:p>
+            <a:pPr lvl="2"/>
+            <a:r>
+              <a:rPr/>
+              <a:t>Global search and replace</a:t>
+            </a:r>
+          </a:p>
+          <a:p>
+            <a:pPr lvl="2"/>
+            <a:r>
+              <a:rPr/>
+              <a:t>Not usually a good idea</a:t>
+            </a:r>
+          </a:p>
+          <a:p>
+            <a:pPr lvl="1"/>
+            <a:r>
+              <a:rPr/>
+              <a:t>Skipping rows</a:t>
+            </a:r>
+          </a:p>
+          <a:p>
+            <a:pPr lvl="1"/>
+            <a:r>
+              <a:rPr/>
+              <a:t>Converting strings to numbers</a:t>
             </a:r>
           </a:p>
         </p:txBody>
@@ -16280,15 +16373,7 @@
             </a:r>
             <a:r>
               <a:rPr/>
-              <a:t>SAS</a:t>
-            </a:r>
-            <a:r>
-              <a:rPr/>
-              <a:t> </a:t>
-            </a:r>
-            <a:r>
-              <a:rPr/>
-              <a:t>code</a:t>
+              <a:t>example</a:t>
             </a:r>
           </a:p>
         </p:txBody>
@@ -16315,16 +16400,11 @@
               <a:rPr sz="1800">
                 <a:latin typeface="Courier"/>
               </a:rPr>
-              <a:t>filename raw_data "../data/space-delimited.txt";
-libname module01 "../data";
-data module01.space_delimited;
-  infile raw_data delimiter=" ";
-  input x y z;
-run;
-proc print
-    data=module01.space_delimited(obs=2);
-  title1 "First two rows of data";
-run;</a:t>
+              <a:t>4 8 40
+8 16 80
+12 24 120
+16 32 160
+24 48 240</a:t>
             </a:r>
           </a:p>
         </p:txBody>
@@ -16371,7 +16451,7 @@
             </a:pPr>
             <a:r>
               <a:rPr/>
-              <a:t>Multi-space</a:t>
+              <a:t>Space</a:t>
             </a:r>
             <a:r>
               <a:rPr/>
@@ -16387,7 +16467,15 @@
             </a:r>
             <a:r>
               <a:rPr/>
-              <a:t>example</a:t>
+              <a:t>SAS</a:t>
+            </a:r>
+            <a:r>
+              <a:rPr/>
+              <a:t> </a:t>
+            </a:r>
+            <a:r>
+              <a:rPr/>
+              <a:t>code</a:t>
             </a:r>
           </a:p>
         </p:txBody>
@@ -16414,11 +16502,16 @@
               <a:rPr sz="1800">
                 <a:latin typeface="Courier"/>
               </a:rPr>
-              <a:t> 4  8  40
- 8 16  80
-12 24 120
-16 32 160
-24 48 240</a:t>
+              <a:t>filename raw_data "../data/space-delimited.txt";
+libname module01 "../data";
+data module01.space_delimited;
+  infile raw_data delimiter=" ";
+  input x y z;
+run;
+proc print
+    data=module01.space_delimited(obs=2);
+  title1 "First two rows of data";
+run;</a:t>
             </a:r>
           </a:p>
         </p:txBody>
@@ -16481,15 +16574,7 @@
             </a:r>
             <a:r>
               <a:rPr/>
-              <a:t>SAS</a:t>
-            </a:r>
-            <a:r>
-              <a:rPr/>
-              <a:t> </a:t>
-            </a:r>
-            <a:r>
-              <a:rPr/>
-              <a:t>code</a:t>
+              <a:t>example</a:t>
             </a:r>
           </a:p>
         </p:txBody>
@@ -16516,16 +16601,11 @@
               <a:rPr sz="1800">
                 <a:latin typeface="Courier"/>
               </a:rPr>
-              <a:t>filename raw_data "../data/multi-delimited.txt";
-libname module01 "../data";
-data module01.multi_delimited;
-  infile raw_data delimiter=" ";
-  input x y z;
-run;
-proc print
-    data=module01.multi_delimited(obs=2);
-  title1 "First two rows of data";
-run;</a:t>
+              <a:t> 4  8  40
+ 8 16  80
+12 24 120
+16 32 160
+24 48 240</a:t>
             </a:r>
           </a:p>
         </p:txBody>
@@ -16572,7 +16652,7 @@
             </a:pPr>
             <a:r>
               <a:rPr/>
-              <a:t>Comma</a:t>
+              <a:t>Multi-space</a:t>
             </a:r>
             <a:r>
               <a:rPr/>
@@ -16588,7 +16668,15 @@
             </a:r>
             <a:r>
               <a:rPr/>
-              <a:t>example</a:t>
+              <a:t>SAS</a:t>
+            </a:r>
+            <a:r>
+              <a:rPr/>
+              <a:t> </a:t>
+            </a:r>
+            <a:r>
+              <a:rPr/>
+              <a:t>code</a:t>
             </a:r>
           </a:p>
         </p:txBody>
@@ -16615,11 +16703,16 @@
               <a:rPr sz="1800">
                 <a:latin typeface="Courier"/>
               </a:rPr>
-              <a:t>4,8,40
-8,16,80
-12,24,120
-16,32,160
-24,48,240</a:t>
+              <a:t>filename raw_data "../data/multi-delimited.txt";
+libname module01 "../data";
+data module01.multi_delimited;
+  infile raw_data delimiter=" ";
+  input x y z;
+run;
+proc print
+    data=module01.multi_delimited(obs=2);
+  title1 "First two rows of data";
+run;</a:t>
             </a:r>
           </a:p>
         </p:txBody>
@@ -16682,15 +16775,7 @@
             </a:r>
             <a:r>
               <a:rPr/>
-              <a:t>SAS</a:t>
-            </a:r>
-            <a:r>
-              <a:rPr/>
-              <a:t> </a:t>
-            </a:r>
-            <a:r>
-              <a:rPr/>
-              <a:t>code</a:t>
+              <a:t>example</a:t>
             </a:r>
           </a:p>
         </p:txBody>
@@ -16717,18 +16802,11 @@
               <a:rPr sz="1800">
                 <a:latin typeface="Courier"/>
               </a:rPr>
-              <a:t>filename raw_data
-  "../data/comma-delimited.csv";
-libname module01
-  "../data";
-data module01.comma_delimited;
-  infile raw_data delimiter=",";
-  input x y z;
-run;
-proc print
-    data=module01.comma_delimited(obs=2);
-  title1 "First two rows of data";
-run;</a:t>
+              <a:t>4,8,40
+8,16,80
+12,24,120
+16,32,160
+24,48,240</a:t>
             </a:r>
           </a:p>
         </p:txBody>

</xml_diff>